<commit_message>
Finished deck for Assignment 3
</commit_message>
<xml_diff>
--- a/Assignment3/Dr. Thorium - Persuasive Presentation.pptx
+++ b/Assignment3/Dr. Thorium - Persuasive Presentation.pptx
@@ -4,17 +4,25 @@
   <p:sldMasterIdLst>
     <p:sldMasterId id="2147483648" r:id="rId1"/>
   </p:sldMasterIdLst>
+  <p:notesMasterIdLst>
+    <p:notesMasterId r:id="rId17"/>
+  </p:notesMasterIdLst>
   <p:sldIdLst>
     <p:sldId id="256" r:id="rId2"/>
-    <p:sldId id="257" r:id="rId3"/>
-    <p:sldId id="261" r:id="rId4"/>
-    <p:sldId id="262" r:id="rId5"/>
-    <p:sldId id="266" r:id="rId6"/>
-    <p:sldId id="265" r:id="rId7"/>
-    <p:sldId id="264" r:id="rId8"/>
-    <p:sldId id="258" r:id="rId9"/>
-    <p:sldId id="259" r:id="rId10"/>
-    <p:sldId id="260" r:id="rId11"/>
+    <p:sldId id="261" r:id="rId3"/>
+    <p:sldId id="276" r:id="rId4"/>
+    <p:sldId id="266" r:id="rId5"/>
+    <p:sldId id="267" r:id="rId6"/>
+    <p:sldId id="268" r:id="rId7"/>
+    <p:sldId id="269" r:id="rId8"/>
+    <p:sldId id="270" r:id="rId9"/>
+    <p:sldId id="271" r:id="rId10"/>
+    <p:sldId id="272" r:id="rId11"/>
+    <p:sldId id="273" r:id="rId12"/>
+    <p:sldId id="274" r:id="rId13"/>
+    <p:sldId id="265" r:id="rId14"/>
+    <p:sldId id="275" r:id="rId15"/>
+    <p:sldId id="277" r:id="rId16"/>
   </p:sldIdLst>
   <p:sldSz cx="12192000" cy="6858000"/>
   <p:notesSz cx="6858000" cy="9144000"/>
@@ -128,8 +136,468 @@
         </p15:guide>
       </p15:sldGuideLst>
     </p:ext>
+    <p:ext uri="{2D200454-40CA-4A62-9FC3-DE9A4176ACB9}">
+      <p15:notesGuideLst xmlns:p15="http://schemas.microsoft.com/office/powerpoint/2012/main">
+        <p15:guide id="1" orient="horz" pos="2880" userDrawn="1">
+          <p15:clr>
+            <a:srgbClr val="A4A3A4"/>
+          </p15:clr>
+        </p15:guide>
+        <p15:guide id="2" pos="2160" userDrawn="1">
+          <p15:clr>
+            <a:srgbClr val="A4A3A4"/>
+          </p15:clr>
+        </p15:guide>
+      </p15:notesGuideLst>
+    </p:ext>
   </p:extLst>
 </p:presentation>
+</file>
+
+<file path=ppt/notesMasters/notesMaster1.xml><?xml version="1.0" encoding="utf-8"?>
+<p:notesMaster xmlns:a="http://schemas.openxmlformats.org/drawingml/2006/main" xmlns:r="http://schemas.openxmlformats.org/officeDocument/2006/relationships" xmlns:p="http://schemas.openxmlformats.org/presentationml/2006/main">
+  <p:cSld>
+    <p:bg>
+      <p:bgRef idx="1001">
+        <a:schemeClr val="bg1"/>
+      </p:bgRef>
+    </p:bg>
+    <p:spTree>
+      <p:nvGrpSpPr>
+        <p:cNvPr id="1" name=""/>
+        <p:cNvGrpSpPr/>
+        <p:nvPr/>
+      </p:nvGrpSpPr>
+      <p:grpSpPr>
+        <a:xfrm>
+          <a:off x="0" y="0"/>
+          <a:ext cx="0" cy="0"/>
+          <a:chOff x="0" y="0"/>
+          <a:chExt cx="0" cy="0"/>
+        </a:xfrm>
+      </p:grpSpPr>
+      <p:sp>
+        <p:nvSpPr>
+          <p:cNvPr id="2" name="Header Placeholder 1"/>
+          <p:cNvSpPr>
+            <a:spLocks noGrp="1"/>
+          </p:cNvSpPr>
+          <p:nvPr>
+            <p:ph type="hdr" sz="quarter"/>
+          </p:nvPr>
+        </p:nvSpPr>
+        <p:spPr>
+          <a:xfrm>
+            <a:off x="0" y="0"/>
+            <a:ext cx="2971800" cy="458788"/>
+          </a:xfrm>
+          <a:prstGeom prst="rect">
+            <a:avLst/>
+          </a:prstGeom>
+        </p:spPr>
+        <p:txBody>
+          <a:bodyPr vert="horz" lIns="91440" tIns="45720" rIns="91440" bIns="45720" rtlCol="0"/>
+          <a:lstStyle>
+            <a:lvl1pPr algn="l">
+              <a:defRPr sz="1200"/>
+            </a:lvl1pPr>
+          </a:lstStyle>
+          <a:p>
+            <a:endParaRPr lang="en-US"/>
+          </a:p>
+        </p:txBody>
+      </p:sp>
+      <p:sp>
+        <p:nvSpPr>
+          <p:cNvPr id="3" name="Date Placeholder 2"/>
+          <p:cNvSpPr>
+            <a:spLocks noGrp="1"/>
+          </p:cNvSpPr>
+          <p:nvPr>
+            <p:ph type="dt" idx="1"/>
+          </p:nvPr>
+        </p:nvSpPr>
+        <p:spPr>
+          <a:xfrm>
+            <a:off x="3884613" y="0"/>
+            <a:ext cx="2971800" cy="458788"/>
+          </a:xfrm>
+          <a:prstGeom prst="rect">
+            <a:avLst/>
+          </a:prstGeom>
+        </p:spPr>
+        <p:txBody>
+          <a:bodyPr vert="horz" lIns="91440" tIns="45720" rIns="91440" bIns="45720" rtlCol="0"/>
+          <a:lstStyle>
+            <a:lvl1pPr algn="r">
+              <a:defRPr sz="1200"/>
+            </a:lvl1pPr>
+          </a:lstStyle>
+          <a:p>
+            <a:fld id="{AC2E5303-81F9-4854-B033-F2D84796B39E}" type="datetimeFigureOut">
+              <a:rPr lang="en-US" smtClean="0"/>
+              <a:t>5/1/2017</a:t>
+            </a:fld>
+            <a:endParaRPr lang="en-US"/>
+          </a:p>
+        </p:txBody>
+      </p:sp>
+      <p:sp>
+        <p:nvSpPr>
+          <p:cNvPr id="4" name="Slide Image Placeholder 3"/>
+          <p:cNvSpPr>
+            <a:spLocks noGrp="1" noRot="1" noChangeAspect="1"/>
+          </p:cNvSpPr>
+          <p:nvPr>
+            <p:ph type="sldImg" idx="2"/>
+          </p:nvPr>
+        </p:nvSpPr>
+        <p:spPr>
+          <a:xfrm>
+            <a:off x="685800" y="1143000"/>
+            <a:ext cx="5486400" cy="3086100"/>
+          </a:xfrm>
+          <a:prstGeom prst="rect">
+            <a:avLst/>
+          </a:prstGeom>
+          <a:noFill/>
+          <a:ln w="12700">
+            <a:solidFill>
+              <a:prstClr val="black"/>
+            </a:solidFill>
+          </a:ln>
+        </p:spPr>
+        <p:txBody>
+          <a:bodyPr vert="horz" lIns="91440" tIns="45720" rIns="91440" bIns="45720" rtlCol="0" anchor="ctr"/>
+          <a:lstStyle/>
+          <a:p>
+            <a:endParaRPr lang="en-US"/>
+          </a:p>
+        </p:txBody>
+      </p:sp>
+      <p:sp>
+        <p:nvSpPr>
+          <p:cNvPr id="5" name="Notes Placeholder 4"/>
+          <p:cNvSpPr>
+            <a:spLocks noGrp="1"/>
+          </p:cNvSpPr>
+          <p:nvPr>
+            <p:ph type="body" sz="quarter" idx="3"/>
+          </p:nvPr>
+        </p:nvSpPr>
+        <p:spPr>
+          <a:xfrm>
+            <a:off x="685800" y="4400550"/>
+            <a:ext cx="5486400" cy="3600450"/>
+          </a:xfrm>
+          <a:prstGeom prst="rect">
+            <a:avLst/>
+          </a:prstGeom>
+        </p:spPr>
+        <p:txBody>
+          <a:bodyPr vert="horz" lIns="91440" tIns="45720" rIns="91440" bIns="45720" rtlCol="0"/>
+          <a:lstStyle/>
+          <a:p>
+            <a:pPr lvl="0"/>
+            <a:r>
+              <a:rPr lang="en-US" smtClean="0"/>
+              <a:t>Click to edit Master text styles</a:t>
+            </a:r>
+          </a:p>
+          <a:p>
+            <a:pPr lvl="1"/>
+            <a:r>
+              <a:rPr lang="en-US" smtClean="0"/>
+              <a:t>Second level</a:t>
+            </a:r>
+          </a:p>
+          <a:p>
+            <a:pPr lvl="2"/>
+            <a:r>
+              <a:rPr lang="en-US" smtClean="0"/>
+              <a:t>Third level</a:t>
+            </a:r>
+          </a:p>
+          <a:p>
+            <a:pPr lvl="3"/>
+            <a:r>
+              <a:rPr lang="en-US" smtClean="0"/>
+              <a:t>Fourth level</a:t>
+            </a:r>
+          </a:p>
+          <a:p>
+            <a:pPr lvl="4"/>
+            <a:r>
+              <a:rPr lang="en-US" smtClean="0"/>
+              <a:t>Fifth level</a:t>
+            </a:r>
+            <a:endParaRPr lang="en-US"/>
+          </a:p>
+        </p:txBody>
+      </p:sp>
+      <p:sp>
+        <p:nvSpPr>
+          <p:cNvPr id="6" name="Footer Placeholder 5"/>
+          <p:cNvSpPr>
+            <a:spLocks noGrp="1"/>
+          </p:cNvSpPr>
+          <p:nvPr>
+            <p:ph type="ftr" sz="quarter" idx="4"/>
+          </p:nvPr>
+        </p:nvSpPr>
+        <p:spPr>
+          <a:xfrm>
+            <a:off x="0" y="8685213"/>
+            <a:ext cx="2971800" cy="458787"/>
+          </a:xfrm>
+          <a:prstGeom prst="rect">
+            <a:avLst/>
+          </a:prstGeom>
+        </p:spPr>
+        <p:txBody>
+          <a:bodyPr vert="horz" lIns="91440" tIns="45720" rIns="91440" bIns="45720" rtlCol="0" anchor="b"/>
+          <a:lstStyle>
+            <a:lvl1pPr algn="l">
+              <a:defRPr sz="1200"/>
+            </a:lvl1pPr>
+          </a:lstStyle>
+          <a:p>
+            <a:endParaRPr lang="en-US"/>
+          </a:p>
+        </p:txBody>
+      </p:sp>
+      <p:sp>
+        <p:nvSpPr>
+          <p:cNvPr id="7" name="Slide Number Placeholder 6"/>
+          <p:cNvSpPr>
+            <a:spLocks noGrp="1"/>
+          </p:cNvSpPr>
+          <p:nvPr>
+            <p:ph type="sldNum" sz="quarter" idx="5"/>
+          </p:nvPr>
+        </p:nvSpPr>
+        <p:spPr>
+          <a:xfrm>
+            <a:off x="3884613" y="8685213"/>
+            <a:ext cx="2971800" cy="458787"/>
+          </a:xfrm>
+          <a:prstGeom prst="rect">
+            <a:avLst/>
+          </a:prstGeom>
+        </p:spPr>
+        <p:txBody>
+          <a:bodyPr vert="horz" lIns="91440" tIns="45720" rIns="91440" bIns="45720" rtlCol="0" anchor="b"/>
+          <a:lstStyle>
+            <a:lvl1pPr algn="r">
+              <a:defRPr sz="1200"/>
+            </a:lvl1pPr>
+          </a:lstStyle>
+          <a:p>
+            <a:fld id="{4568C760-1B17-4555-A4E5-4E39CCCEF022}" type="slidenum">
+              <a:rPr lang="en-US" smtClean="0"/>
+              <a:t>‹#›</a:t>
+            </a:fld>
+            <a:endParaRPr lang="en-US"/>
+          </a:p>
+        </p:txBody>
+      </p:sp>
+    </p:spTree>
+    <p:extLst>
+      <p:ext uri="{BB962C8B-B14F-4D97-AF65-F5344CB8AC3E}">
+        <p14:creationId xmlns:p14="http://schemas.microsoft.com/office/powerpoint/2010/main" val="1943765077"/>
+      </p:ext>
+    </p:extLst>
+  </p:cSld>
+  <p:clrMap bg1="lt1" tx1="dk1" bg2="lt2" tx2="dk2" accent1="accent1" accent2="accent2" accent3="accent3" accent4="accent4" accent5="accent5" accent6="accent6" hlink="hlink" folHlink="folHlink"/>
+  <p:notesStyle>
+    <a:lvl1pPr marL="0" algn="l" defTabSz="914400" rtl="0" eaLnBrk="1" latinLnBrk="0" hangingPunct="1">
+      <a:defRPr sz="1200" kern="1200">
+        <a:solidFill>
+          <a:schemeClr val="tx1"/>
+        </a:solidFill>
+        <a:latin typeface="+mn-lt"/>
+        <a:ea typeface="+mn-ea"/>
+        <a:cs typeface="+mn-cs"/>
+      </a:defRPr>
+    </a:lvl1pPr>
+    <a:lvl2pPr marL="457200" algn="l" defTabSz="914400" rtl="0" eaLnBrk="1" latinLnBrk="0" hangingPunct="1">
+      <a:defRPr sz="1200" kern="1200">
+        <a:solidFill>
+          <a:schemeClr val="tx1"/>
+        </a:solidFill>
+        <a:latin typeface="+mn-lt"/>
+        <a:ea typeface="+mn-ea"/>
+        <a:cs typeface="+mn-cs"/>
+      </a:defRPr>
+    </a:lvl2pPr>
+    <a:lvl3pPr marL="914400" algn="l" defTabSz="914400" rtl="0" eaLnBrk="1" latinLnBrk="0" hangingPunct="1">
+      <a:defRPr sz="1200" kern="1200">
+        <a:solidFill>
+          <a:schemeClr val="tx1"/>
+        </a:solidFill>
+        <a:latin typeface="+mn-lt"/>
+        <a:ea typeface="+mn-ea"/>
+        <a:cs typeface="+mn-cs"/>
+      </a:defRPr>
+    </a:lvl3pPr>
+    <a:lvl4pPr marL="1371600" algn="l" defTabSz="914400" rtl="0" eaLnBrk="1" latinLnBrk="0" hangingPunct="1">
+      <a:defRPr sz="1200" kern="1200">
+        <a:solidFill>
+          <a:schemeClr val="tx1"/>
+        </a:solidFill>
+        <a:latin typeface="+mn-lt"/>
+        <a:ea typeface="+mn-ea"/>
+        <a:cs typeface="+mn-cs"/>
+      </a:defRPr>
+    </a:lvl4pPr>
+    <a:lvl5pPr marL="1828800" algn="l" defTabSz="914400" rtl="0" eaLnBrk="1" latinLnBrk="0" hangingPunct="1">
+      <a:defRPr sz="1200" kern="1200">
+        <a:solidFill>
+          <a:schemeClr val="tx1"/>
+        </a:solidFill>
+        <a:latin typeface="+mn-lt"/>
+        <a:ea typeface="+mn-ea"/>
+        <a:cs typeface="+mn-cs"/>
+      </a:defRPr>
+    </a:lvl5pPr>
+    <a:lvl6pPr marL="2286000" algn="l" defTabSz="914400" rtl="0" eaLnBrk="1" latinLnBrk="0" hangingPunct="1">
+      <a:defRPr sz="1200" kern="1200">
+        <a:solidFill>
+          <a:schemeClr val="tx1"/>
+        </a:solidFill>
+        <a:latin typeface="+mn-lt"/>
+        <a:ea typeface="+mn-ea"/>
+        <a:cs typeface="+mn-cs"/>
+      </a:defRPr>
+    </a:lvl6pPr>
+    <a:lvl7pPr marL="2743200" algn="l" defTabSz="914400" rtl="0" eaLnBrk="1" latinLnBrk="0" hangingPunct="1">
+      <a:defRPr sz="1200" kern="1200">
+        <a:solidFill>
+          <a:schemeClr val="tx1"/>
+        </a:solidFill>
+        <a:latin typeface="+mn-lt"/>
+        <a:ea typeface="+mn-ea"/>
+        <a:cs typeface="+mn-cs"/>
+      </a:defRPr>
+    </a:lvl7pPr>
+    <a:lvl8pPr marL="3200400" algn="l" defTabSz="914400" rtl="0" eaLnBrk="1" latinLnBrk="0" hangingPunct="1">
+      <a:defRPr sz="1200" kern="1200">
+        <a:solidFill>
+          <a:schemeClr val="tx1"/>
+        </a:solidFill>
+        <a:latin typeface="+mn-lt"/>
+        <a:ea typeface="+mn-ea"/>
+        <a:cs typeface="+mn-cs"/>
+      </a:defRPr>
+    </a:lvl8pPr>
+    <a:lvl9pPr marL="3657600" algn="l" defTabSz="914400" rtl="0" eaLnBrk="1" latinLnBrk="0" hangingPunct="1">
+      <a:defRPr sz="1200" kern="1200">
+        <a:solidFill>
+          <a:schemeClr val="tx1"/>
+        </a:solidFill>
+        <a:latin typeface="+mn-lt"/>
+        <a:ea typeface="+mn-ea"/>
+        <a:cs typeface="+mn-cs"/>
+      </a:defRPr>
+    </a:lvl9pPr>
+  </p:notesStyle>
+</p:notesMaster>
+</file>
+
+<file path=ppt/notesSlides/notesSlide1.xml><?xml version="1.0" encoding="utf-8"?>
+<p:notes xmlns:a="http://schemas.openxmlformats.org/drawingml/2006/main" xmlns:r="http://schemas.openxmlformats.org/officeDocument/2006/relationships" xmlns:p="http://schemas.openxmlformats.org/presentationml/2006/main">
+  <p:cSld>
+    <p:spTree>
+      <p:nvGrpSpPr>
+        <p:cNvPr id="1" name=""/>
+        <p:cNvGrpSpPr/>
+        <p:nvPr/>
+      </p:nvGrpSpPr>
+      <p:grpSpPr>
+        <a:xfrm>
+          <a:off x="0" y="0"/>
+          <a:ext cx="0" cy="0"/>
+          <a:chOff x="0" y="0"/>
+          <a:chExt cx="0" cy="0"/>
+        </a:xfrm>
+      </p:grpSpPr>
+      <p:sp>
+        <p:nvSpPr>
+          <p:cNvPr id="2" name="Slide Image Placeholder 1"/>
+          <p:cNvSpPr>
+            <a:spLocks noGrp="1" noRot="1" noChangeAspect="1"/>
+          </p:cNvSpPr>
+          <p:nvPr>
+            <p:ph type="sldImg"/>
+          </p:nvPr>
+        </p:nvSpPr>
+        <p:spPr/>
+      </p:sp>
+      <p:sp>
+        <p:nvSpPr>
+          <p:cNvPr id="3" name="Notes Placeholder 2"/>
+          <p:cNvSpPr>
+            <a:spLocks noGrp="1"/>
+          </p:cNvSpPr>
+          <p:nvPr>
+            <p:ph type="body" idx="1"/>
+          </p:nvPr>
+        </p:nvSpPr>
+        <p:spPr/>
+        <p:txBody>
+          <a:bodyPr/>
+          <a:lstStyle/>
+          <a:p>
+            <a:r>
+              <a:rPr lang="en-US" dirty="0" smtClean="0"/>
+              <a:t>http://thehill.com/special-reports/energy-a-environment-september-2010/120419-top-10-reasons-nuclear-power-will-be-the-key-to-americas-energy-future</a:t>
+            </a:r>
+          </a:p>
+          <a:p>
+            <a:endParaRPr lang="en-US" dirty="0" smtClean="0"/>
+          </a:p>
+          <a:p>
+            <a:r>
+              <a:rPr lang="en-US" smtClean="0"/>
+              <a:t>https://qz.com/89336/everything-you-thought-you-knew-about-the-risks-of-nuclear-energy-is-wrong/</a:t>
+            </a:r>
+          </a:p>
+        </p:txBody>
+      </p:sp>
+      <p:sp>
+        <p:nvSpPr>
+          <p:cNvPr id="4" name="Slide Number Placeholder 3"/>
+          <p:cNvSpPr>
+            <a:spLocks noGrp="1"/>
+          </p:cNvSpPr>
+          <p:nvPr>
+            <p:ph type="sldNum" sz="quarter" idx="10"/>
+          </p:nvPr>
+        </p:nvSpPr>
+        <p:spPr/>
+        <p:txBody>
+          <a:bodyPr/>
+          <a:lstStyle/>
+          <a:p>
+            <a:fld id="{4568C760-1B17-4555-A4E5-4E39CCCEF022}" type="slidenum">
+              <a:rPr lang="en-US" smtClean="0"/>
+              <a:t>1</a:t>
+            </a:fld>
+            <a:endParaRPr lang="en-US"/>
+          </a:p>
+        </p:txBody>
+      </p:sp>
+    </p:spTree>
+    <p:extLst>
+      <p:ext uri="{BB962C8B-B14F-4D97-AF65-F5344CB8AC3E}">
+        <p14:creationId xmlns:p14="http://schemas.microsoft.com/office/powerpoint/2010/main" val="831108276"/>
+      </p:ext>
+    </p:extLst>
+  </p:cSld>
+  <p:clrMapOvr>
+    <a:masterClrMapping/>
+  </p:clrMapOvr>
+</p:notes>
 </file>
 
 <file path=ppt/slideLayouts/slideLayout1.xml><?xml version="1.0" encoding="utf-8"?>
@@ -4414,7 +4882,7 @@
           <a:p>
             <a:fld id="{48A87A34-81AB-432B-8DAE-1953F412C126}" type="datetimeFigureOut">
               <a:rPr lang="en-US" dirty="0"/>
-              <a:t>4/24/2017</a:t>
+              <a:t>5/1/2017</a:t>
             </a:fld>
             <a:endParaRPr lang="en-US" dirty="0"/>
           </a:p>
@@ -4676,7 +5144,7 @@
           <a:p>
             <a:fld id="{48A87A34-81AB-432B-8DAE-1953F412C126}" type="datetimeFigureOut">
               <a:rPr lang="en-US" dirty="0"/>
-              <a:t>4/24/2017</a:t>
+              <a:t>5/1/2017</a:t>
             </a:fld>
             <a:endParaRPr lang="en-US" dirty="0"/>
           </a:p>
@@ -4867,7 +5335,7 @@
           <a:p>
             <a:fld id="{48A87A34-81AB-432B-8DAE-1953F412C126}" type="datetimeFigureOut">
               <a:rPr lang="en-US" dirty="0"/>
-              <a:t>4/24/2017</a:t>
+              <a:t>5/1/2017</a:t>
             </a:fld>
             <a:endParaRPr lang="en-US" dirty="0"/>
           </a:p>
@@ -5125,7 +5593,7 @@
           <a:p>
             <a:fld id="{48A87A34-81AB-432B-8DAE-1953F412C126}" type="datetimeFigureOut">
               <a:rPr lang="en-US" dirty="0"/>
-              <a:t>4/24/2017</a:t>
+              <a:t>5/1/2017</a:t>
             </a:fld>
             <a:endParaRPr lang="en-US" dirty="0"/>
           </a:p>
@@ -5554,7 +6022,7 @@
           <a:p>
             <a:fld id="{48A87A34-81AB-432B-8DAE-1953F412C126}" type="datetimeFigureOut">
               <a:rPr lang="en-US" dirty="0"/>
-              <a:t>4/24/2017</a:t>
+              <a:t>5/1/2017</a:t>
             </a:fld>
             <a:endParaRPr lang="en-US" dirty="0"/>
           </a:p>
@@ -6095,7 +6563,7 @@
           <a:p>
             <a:fld id="{48A87A34-81AB-432B-8DAE-1953F412C126}" type="datetimeFigureOut">
               <a:rPr lang="en-US" dirty="0"/>
-              <a:t>4/24/2017</a:t>
+              <a:t>5/1/2017</a:t>
             </a:fld>
             <a:endParaRPr lang="en-US" dirty="0"/>
           </a:p>
@@ -6810,7 +7278,7 @@
           <a:p>
             <a:fld id="{48A87A34-81AB-432B-8DAE-1953F412C126}" type="datetimeFigureOut">
               <a:rPr lang="en-US" dirty="0"/>
-              <a:t>4/24/2017</a:t>
+              <a:t>5/1/2017</a:t>
             </a:fld>
             <a:endParaRPr lang="en-US" dirty="0"/>
           </a:p>
@@ -6975,7 +7443,7 @@
           <a:p>
             <a:fld id="{48A87A34-81AB-432B-8DAE-1953F412C126}" type="datetimeFigureOut">
               <a:rPr lang="en-US" dirty="0"/>
-              <a:t>4/24/2017</a:t>
+              <a:t>5/1/2017</a:t>
             </a:fld>
             <a:endParaRPr lang="en-US" dirty="0"/>
           </a:p>
@@ -7150,7 +7618,7 @@
           <a:p>
             <a:fld id="{48A87A34-81AB-432B-8DAE-1953F412C126}" type="datetimeFigureOut">
               <a:rPr lang="en-US" dirty="0"/>
-              <a:t>4/24/2017</a:t>
+              <a:t>5/1/2017</a:t>
             </a:fld>
             <a:endParaRPr lang="en-US" dirty="0"/>
           </a:p>
@@ -7315,7 +7783,7 @@
           <a:p>
             <a:fld id="{48A87A34-81AB-432B-8DAE-1953F412C126}" type="datetimeFigureOut">
               <a:rPr lang="en-US" dirty="0"/>
-              <a:t>4/24/2017</a:t>
+              <a:t>5/1/2017</a:t>
             </a:fld>
             <a:endParaRPr lang="en-US" dirty="0"/>
           </a:p>
@@ -7560,7 +8028,7 @@
           <a:p>
             <a:fld id="{48A87A34-81AB-432B-8DAE-1953F412C126}" type="datetimeFigureOut">
               <a:rPr lang="en-US" dirty="0"/>
-              <a:t>4/24/2017</a:t>
+              <a:t>5/1/2017</a:t>
             </a:fld>
             <a:endParaRPr lang="en-US" dirty="0"/>
           </a:p>
@@ -7787,7 +8255,7 @@
           <a:p>
             <a:fld id="{48A87A34-81AB-432B-8DAE-1953F412C126}" type="datetimeFigureOut">
               <a:rPr lang="en-US" dirty="0"/>
-              <a:t>4/24/2017</a:t>
+              <a:t>5/1/2017</a:t>
             </a:fld>
             <a:endParaRPr lang="en-US" dirty="0"/>
           </a:p>
@@ -8163,7 +8631,7 @@
           <a:p>
             <a:fld id="{48A87A34-81AB-432B-8DAE-1953F412C126}" type="datetimeFigureOut">
               <a:rPr lang="en-US" dirty="0"/>
-              <a:t>4/24/2017</a:t>
+              <a:t>5/1/2017</a:t>
             </a:fld>
             <a:endParaRPr lang="en-US" dirty="0"/>
           </a:p>
@@ -8276,7 +8744,7 @@
           <a:p>
             <a:fld id="{48A87A34-81AB-432B-8DAE-1953F412C126}" type="datetimeFigureOut">
               <a:rPr lang="en-US" dirty="0"/>
-              <a:t>4/24/2017</a:t>
+              <a:t>5/1/2017</a:t>
             </a:fld>
             <a:endParaRPr lang="en-US" dirty="0"/>
           </a:p>
@@ -8366,7 +8834,7 @@
           <a:p>
             <a:fld id="{48A87A34-81AB-432B-8DAE-1953F412C126}" type="datetimeFigureOut">
               <a:rPr lang="en-US" dirty="0"/>
-              <a:t>4/24/2017</a:t>
+              <a:t>5/1/2017</a:t>
             </a:fld>
             <a:endParaRPr lang="en-US" dirty="0"/>
           </a:p>
@@ -8610,7 +9078,7 @@
           <a:p>
             <a:fld id="{48A87A34-81AB-432B-8DAE-1953F412C126}" type="datetimeFigureOut">
               <a:rPr lang="en-US" dirty="0"/>
-              <a:t>4/24/2017</a:t>
+              <a:t>5/1/2017</a:t>
             </a:fld>
             <a:endParaRPr lang="en-US" dirty="0"/>
           </a:p>
@@ -8885,7 +9353,7 @@
           <a:p>
             <a:fld id="{48A87A34-81AB-432B-8DAE-1953F412C126}" type="datetimeFigureOut">
               <a:rPr lang="en-US" dirty="0"/>
-              <a:t>4/24/2017</a:t>
+              <a:t>5/1/2017</a:t>
             </a:fld>
             <a:endParaRPr lang="en-US" dirty="0"/>
           </a:p>
@@ -11948,7 +12416,7 @@
             <a:fld id="{48A87A34-81AB-432B-8DAE-1953F412C126}" type="datetimeFigureOut">
               <a:rPr lang="en-US" dirty="0"/>
               <a:pPr/>
-              <a:t>4/24/2017</a:t>
+              <a:t>5/1/2017</a:t>
             </a:fld>
             <a:endParaRPr lang="en-US" dirty="0"/>
           </a:p>
@@ -12467,55 +12935,206 @@
             <p:ph type="title"/>
           </p:nvPr>
         </p:nvSpPr>
-        <p:spPr/>
+        <p:spPr>
+          <a:xfrm>
+            <a:off x="1141413" y="618518"/>
+            <a:ext cx="9905998" cy="672400"/>
+          </a:xfrm>
+        </p:spPr>
         <p:txBody>
-          <a:bodyPr/>
+          <a:bodyPr>
+            <a:normAutofit/>
+          </a:bodyPr>
           <a:lstStyle/>
           <a:p>
+            <a:pPr algn="ctr"/>
             <a:r>
               <a:rPr lang="en-US" dirty="0" smtClean="0"/>
-              <a:t>Future State (Imagined Future Reality)</a:t>
+              <a:t>7. Reducing </a:t>
+            </a:r>
+            <a:r>
+              <a:rPr lang="en-US" dirty="0" smtClean="0"/>
+              <a:t>nuclear </a:t>
+            </a:r>
+            <a:r>
+              <a:rPr lang="en-US" dirty="0" smtClean="0"/>
+              <a:t>Arms</a:t>
             </a:r>
             <a:endParaRPr lang="en-US" dirty="0"/>
           </a:p>
         </p:txBody>
       </p:sp>
-      <p:sp>
-        <p:nvSpPr>
-          <p:cNvPr id="3" name="Content Placeholder 2"/>
-          <p:cNvSpPr>
-            <a:spLocks noGrp="1"/>
-          </p:cNvSpPr>
-          <p:nvPr>
-            <p:ph idx="1"/>
-          </p:nvPr>
-        </p:nvSpPr>
-        <p:spPr/>
-        <p:txBody>
-          <a:bodyPr/>
-          <a:lstStyle/>
-          <a:p>
-            <a:r>
-              <a:rPr lang="en-US" dirty="0"/>
-              <a:t>https://qz.com/89336/everything-you-thought-you-knew-about-the-risks-of-nuclear-energy-is-wrong/</a:t>
-            </a:r>
-          </a:p>
-        </p:txBody>
-      </p:sp>
+      <p:pic>
+        <p:nvPicPr>
+          <p:cNvPr id="6146" name="Picture 2" descr="Image result for nuclear arms"/>
+          <p:cNvPicPr>
+            <a:picLocks noChangeAspect="1" noChangeArrowheads="1"/>
+          </p:cNvPicPr>
+          <p:nvPr/>
+        </p:nvPicPr>
+        <p:blipFill>
+          <a:blip r:embed="rId2">
+            <a:extLst>
+              <a:ext uri="{28A0092B-C50C-407E-A947-70E740481C1C}">
+                <a14:useLocalDpi xmlns:a14="http://schemas.microsoft.com/office/drawing/2010/main" val="0"/>
+              </a:ext>
+            </a:extLst>
+          </a:blip>
+          <a:srcRect/>
+          <a:stretch>
+            <a:fillRect/>
+          </a:stretch>
+        </p:blipFill>
+        <p:spPr bwMode="auto">
+          <a:xfrm>
+            <a:off x="4226439" y="1205921"/>
+            <a:ext cx="3739122" cy="4446158"/>
+          </a:xfrm>
+          <a:prstGeom prst="rect">
+            <a:avLst/>
+          </a:prstGeom>
+          <a:noFill/>
+          <a:extLst>
+            <a:ext uri="{909E8E84-426E-40DD-AFC4-6F175D3DCCD1}">
+              <a14:hiddenFill xmlns:a14="http://schemas.microsoft.com/office/drawing/2010/main">
+                <a:solidFill>
+                  <a:srgbClr val="FFFFFF"/>
+                </a:solidFill>
+              </a14:hiddenFill>
+            </a:ext>
+          </a:extLst>
+        </p:spPr>
+      </p:pic>
     </p:spTree>
     <p:extLst>
       <p:ext uri="{BB962C8B-B14F-4D97-AF65-F5344CB8AC3E}">
-        <p14:creationId xmlns:p14="http://schemas.microsoft.com/office/powerpoint/2010/main" val="3859050555"/>
+        <p14:creationId xmlns:p14="http://schemas.microsoft.com/office/powerpoint/2010/main" val="2505106609"/>
       </p:ext>
     </p:extLst>
   </p:cSld>
   <p:clrMapOvr>
     <a:masterClrMapping/>
   </p:clrMapOvr>
+  <p:timing>
+    <p:tnLst>
+      <p:par>
+        <p:cTn id="1" dur="indefinite" restart="never" nodeType="tmRoot"/>
+      </p:par>
+    </p:tnLst>
+  </p:timing>
 </p:sld>
 </file>
 
-<file path=ppt/slides/slide2.xml><?xml version="1.0" encoding="utf-8"?>
+<file path=ppt/slides/slide11.xml><?xml version="1.0" encoding="utf-8"?>
+<p:sld xmlns:a="http://schemas.openxmlformats.org/drawingml/2006/main" xmlns:r="http://schemas.openxmlformats.org/officeDocument/2006/relationships" xmlns:p="http://schemas.openxmlformats.org/presentationml/2006/main">
+  <p:cSld>
+    <p:spTree>
+      <p:nvGrpSpPr>
+        <p:cNvPr id="1" name=""/>
+        <p:cNvGrpSpPr/>
+        <p:nvPr/>
+      </p:nvGrpSpPr>
+      <p:grpSpPr>
+        <a:xfrm>
+          <a:off x="0" y="0"/>
+          <a:ext cx="0" cy="0"/>
+          <a:chOff x="0" y="0"/>
+          <a:chExt cx="0" cy="0"/>
+        </a:xfrm>
+      </p:grpSpPr>
+      <p:sp>
+        <p:nvSpPr>
+          <p:cNvPr id="2" name="Title 1"/>
+          <p:cNvSpPr>
+            <a:spLocks noGrp="1"/>
+          </p:cNvSpPr>
+          <p:nvPr>
+            <p:ph type="title"/>
+          </p:nvPr>
+        </p:nvSpPr>
+        <p:spPr>
+          <a:xfrm>
+            <a:off x="1141413" y="618518"/>
+            <a:ext cx="9905998" cy="648967"/>
+          </a:xfrm>
+        </p:spPr>
+        <p:txBody>
+          <a:bodyPr>
+            <a:normAutofit/>
+          </a:bodyPr>
+          <a:lstStyle/>
+          <a:p>
+            <a:pPr algn="ctr"/>
+            <a:r>
+              <a:rPr lang="en-US" dirty="0" smtClean="0"/>
+              <a:t>8. International Competitiveness</a:t>
+            </a:r>
+            <a:endParaRPr lang="en-US" dirty="0"/>
+          </a:p>
+        </p:txBody>
+      </p:sp>
+      <p:pic>
+        <p:nvPicPr>
+          <p:cNvPr id="7170" name="Picture 2" descr="Image result for clear background olympic rings"/>
+          <p:cNvPicPr>
+            <a:picLocks noChangeAspect="1" noChangeArrowheads="1"/>
+          </p:cNvPicPr>
+          <p:nvPr/>
+        </p:nvPicPr>
+        <p:blipFill>
+          <a:blip r:embed="rId2">
+            <a:extLst>
+              <a:ext uri="{28A0092B-C50C-407E-A947-70E740481C1C}">
+                <a14:useLocalDpi xmlns:a14="http://schemas.microsoft.com/office/drawing/2010/main" val="0"/>
+              </a:ext>
+            </a:extLst>
+          </a:blip>
+          <a:srcRect/>
+          <a:stretch>
+            <a:fillRect/>
+          </a:stretch>
+        </p:blipFill>
+        <p:spPr bwMode="auto">
+          <a:xfrm>
+            <a:off x="1219200" y="1062037"/>
+            <a:ext cx="9753600" cy="4733925"/>
+          </a:xfrm>
+          <a:prstGeom prst="rect">
+            <a:avLst/>
+          </a:prstGeom>
+          <a:noFill/>
+          <a:extLst>
+            <a:ext uri="{909E8E84-426E-40DD-AFC4-6F175D3DCCD1}">
+              <a14:hiddenFill xmlns:a14="http://schemas.microsoft.com/office/drawing/2010/main">
+                <a:solidFill>
+                  <a:srgbClr val="FFFFFF"/>
+                </a:solidFill>
+              </a14:hiddenFill>
+            </a:ext>
+          </a:extLst>
+        </p:spPr>
+      </p:pic>
+    </p:spTree>
+    <p:extLst>
+      <p:ext uri="{BB962C8B-B14F-4D97-AF65-F5344CB8AC3E}">
+        <p14:creationId xmlns:p14="http://schemas.microsoft.com/office/powerpoint/2010/main" val="4285052703"/>
+      </p:ext>
+    </p:extLst>
+  </p:cSld>
+  <p:clrMapOvr>
+    <a:masterClrMapping/>
+  </p:clrMapOvr>
+  <p:timing>
+    <p:tnLst>
+      <p:par>
+        <p:cTn id="1" dur="indefinite" restart="never" nodeType="tmRoot"/>
+      </p:par>
+    </p:tnLst>
+  </p:timing>
+</p:sld>
+</file>
+
+<file path=ppt/slides/slide12.xml><?xml version="1.0" encoding="utf-8"?>
 <p:sld xmlns:a="http://schemas.openxmlformats.org/drawingml/2006/main" xmlns:r="http://schemas.openxmlformats.org/officeDocument/2006/relationships" xmlns:p="http://schemas.openxmlformats.org/presentationml/2006/main">
   <p:cSld>
     <p:spTree>
@@ -12547,224 +13166,543 @@
           <a:bodyPr/>
           <a:lstStyle/>
           <a:p>
-            <a:endParaRPr lang="en-US"/>
+            <a:pPr algn="ctr"/>
+            <a:r>
+              <a:rPr lang="en-US" dirty="0" smtClean="0"/>
+              <a:t>9. Safety</a:t>
+            </a:r>
+            <a:endParaRPr lang="en-US" dirty="0"/>
           </a:p>
         </p:txBody>
       </p:sp>
-      <p:sp>
-        <p:nvSpPr>
-          <p:cNvPr id="3" name="Content Placeholder 2"/>
-          <p:cNvSpPr>
-            <a:spLocks noGrp="1"/>
-          </p:cNvSpPr>
-          <p:nvPr>
-            <p:ph idx="1"/>
-          </p:nvPr>
-        </p:nvSpPr>
-        <p:spPr/>
-        <p:txBody>
-          <a:bodyPr>
-            <a:normAutofit fontScale="70000" lnSpcReduction="20000"/>
-          </a:bodyPr>
-          <a:lstStyle/>
-          <a:p>
-            <a:r>
-              <a:rPr lang="en-US" dirty="0"/>
-              <a:t>Rule 1: Resonance causes change</a:t>
-            </a:r>
-            <a:r>
-              <a:rPr lang="en-US" dirty="0" smtClean="0"/>
-              <a:t>.</a:t>
-            </a:r>
-            <a:endParaRPr lang="en-US" dirty="0"/>
-          </a:p>
-          <a:p>
-            <a:r>
-              <a:rPr lang="en-US" dirty="0"/>
-              <a:t>Rule 2: Incorporating story </a:t>
-            </a:r>
-            <a:r>
-              <a:rPr lang="en-US" dirty="0" smtClean="0"/>
-              <a:t>into presentations </a:t>
-            </a:r>
-            <a:r>
-              <a:rPr lang="en-US" dirty="0"/>
-              <a:t>has an exponential </a:t>
-            </a:r>
-            <a:r>
-              <a:rPr lang="en-US" dirty="0" smtClean="0"/>
-              <a:t>effect on </a:t>
-            </a:r>
-            <a:r>
-              <a:rPr lang="en-US" dirty="0"/>
-              <a:t>outcomes</a:t>
-            </a:r>
-            <a:r>
-              <a:rPr lang="en-US" dirty="0" smtClean="0"/>
-              <a:t>.</a:t>
-            </a:r>
-            <a:endParaRPr lang="en-US" dirty="0"/>
-          </a:p>
-          <a:p>
-            <a:r>
-              <a:rPr lang="en-US" dirty="0"/>
-              <a:t>Rule 3: If the author knows </a:t>
-            </a:r>
-            <a:r>
-              <a:rPr lang="en-US" dirty="0" smtClean="0"/>
-              <a:t>the audience’s </a:t>
-            </a:r>
-            <a:r>
-              <a:rPr lang="en-US" dirty="0"/>
-              <a:t>resonant frequency, </a:t>
-            </a:r>
-            <a:r>
-              <a:rPr lang="en-US" dirty="0" smtClean="0"/>
-              <a:t>and tunes </a:t>
-            </a:r>
-            <a:r>
-              <a:rPr lang="en-US" dirty="0"/>
-              <a:t>to that, the audience will move</a:t>
-            </a:r>
-            <a:r>
-              <a:rPr lang="en-US" dirty="0" smtClean="0"/>
-              <a:t>.</a:t>
-            </a:r>
-            <a:endParaRPr lang="en-US" dirty="0"/>
-          </a:p>
-          <a:p>
-            <a:r>
-              <a:rPr lang="en-US" dirty="0"/>
-              <a:t>Rule 4: Every audience will persist in </a:t>
-            </a:r>
-            <a:r>
-              <a:rPr lang="en-US" dirty="0" smtClean="0"/>
-              <a:t>a state </a:t>
-            </a:r>
-            <a:r>
-              <a:rPr lang="en-US" dirty="0"/>
-              <a:t>of rest unless compelled </a:t>
-            </a:r>
-            <a:r>
-              <a:rPr lang="en-US" dirty="0" smtClean="0"/>
-              <a:t>to change.</a:t>
-            </a:r>
-            <a:endParaRPr lang="en-US" dirty="0"/>
-          </a:p>
-          <a:p>
-            <a:r>
-              <a:rPr lang="en-US" dirty="0"/>
-              <a:t>Rule 5: Use the big idea to filter out </a:t>
-            </a:r>
-            <a:r>
-              <a:rPr lang="en-US" dirty="0" smtClean="0"/>
-              <a:t>all frequencies </a:t>
-            </a:r>
-            <a:r>
-              <a:rPr lang="en-US" dirty="0"/>
-              <a:t>other than the </a:t>
-            </a:r>
-            <a:r>
-              <a:rPr lang="en-US" dirty="0" smtClean="0"/>
-              <a:t>resonant frequency.</a:t>
-            </a:r>
-            <a:endParaRPr lang="en-US" dirty="0"/>
-          </a:p>
-          <a:p>
-            <a:r>
-              <a:rPr lang="en-US" dirty="0"/>
-              <a:t>Rule 6: Structure is greater than the </a:t>
-            </a:r>
-            <a:r>
-              <a:rPr lang="en-US" dirty="0" smtClean="0"/>
-              <a:t>sum of </a:t>
-            </a:r>
-            <a:r>
-              <a:rPr lang="en-US" dirty="0"/>
-              <a:t>its parts</a:t>
-            </a:r>
-            <a:r>
-              <a:rPr lang="en-US" dirty="0" smtClean="0"/>
-              <a:t>.</a:t>
-            </a:r>
-            <a:endParaRPr lang="en-US" dirty="0"/>
-          </a:p>
-          <a:p>
-            <a:r>
-              <a:rPr lang="en-US" dirty="0"/>
-              <a:t>Rule 7: Memorable moments </a:t>
-            </a:r>
-            <a:r>
-              <a:rPr lang="en-US" dirty="0" smtClean="0"/>
-              <a:t>are repeated </a:t>
-            </a:r>
-            <a:r>
-              <a:rPr lang="en-US" dirty="0"/>
-              <a:t>and retransmitted so </a:t>
-            </a:r>
-            <a:r>
-              <a:rPr lang="en-US" dirty="0" smtClean="0"/>
-              <a:t>they cover </a:t>
-            </a:r>
-            <a:r>
-              <a:rPr lang="en-US" dirty="0"/>
-              <a:t>longer distances</a:t>
-            </a:r>
-            <a:r>
-              <a:rPr lang="en-US" dirty="0" smtClean="0"/>
-              <a:t>.</a:t>
-            </a:r>
-            <a:endParaRPr lang="en-US" dirty="0"/>
-          </a:p>
-          <a:p>
-            <a:r>
-              <a:rPr lang="en-US" dirty="0"/>
-              <a:t>Rule 8: Audience interest is </a:t>
-            </a:r>
-            <a:r>
-              <a:rPr lang="en-US" dirty="0" smtClean="0"/>
-              <a:t>directly proportionate </a:t>
-            </a:r>
-            <a:r>
-              <a:rPr lang="en-US" dirty="0"/>
-              <a:t>to the </a:t>
-            </a:r>
-            <a:r>
-              <a:rPr lang="en-US" dirty="0" smtClean="0"/>
-              <a:t>presenter’s preparation.</a:t>
-            </a:r>
-            <a:endParaRPr lang="en-US" dirty="0"/>
-          </a:p>
-          <a:p>
-            <a:r>
-              <a:rPr lang="en-US" dirty="0"/>
-              <a:t>Rule 9: Your imagination can create </a:t>
-            </a:r>
-            <a:r>
-              <a:rPr lang="en-US" dirty="0" smtClean="0"/>
-              <a:t>a reality</a:t>
-            </a:r>
-            <a:r>
-              <a:rPr lang="en-US" dirty="0"/>
-              <a:t>.</a:t>
-            </a:r>
-          </a:p>
-        </p:txBody>
-      </p:sp>
+      <p:pic>
+        <p:nvPicPr>
+          <p:cNvPr id="8194" name="Picture 2" descr="Image result for nuclear energy safety"/>
+          <p:cNvPicPr>
+            <a:picLocks noChangeAspect="1" noChangeArrowheads="1"/>
+          </p:cNvPicPr>
+          <p:nvPr/>
+        </p:nvPicPr>
+        <p:blipFill>
+          <a:blip r:embed="rId2">
+            <a:extLst>
+              <a:ext uri="{28A0092B-C50C-407E-A947-70E740481C1C}">
+                <a14:useLocalDpi xmlns:a14="http://schemas.microsoft.com/office/drawing/2010/main" val="0"/>
+              </a:ext>
+            </a:extLst>
+          </a:blip>
+          <a:srcRect/>
+          <a:stretch>
+            <a:fillRect/>
+          </a:stretch>
+        </p:blipFill>
+        <p:spPr bwMode="auto">
+          <a:xfrm>
+            <a:off x="2979737" y="1704974"/>
+            <a:ext cx="6229350" cy="3448051"/>
+          </a:xfrm>
+          <a:prstGeom prst="rect">
+            <a:avLst/>
+          </a:prstGeom>
+          <a:noFill/>
+          <a:extLst>
+            <a:ext uri="{909E8E84-426E-40DD-AFC4-6F175D3DCCD1}">
+              <a14:hiddenFill xmlns:a14="http://schemas.microsoft.com/office/drawing/2010/main">
+                <a:solidFill>
+                  <a:srgbClr val="FFFFFF"/>
+                </a:solidFill>
+              </a14:hiddenFill>
+            </a:ext>
+          </a:extLst>
+        </p:spPr>
+      </p:pic>
     </p:spTree>
     <p:extLst>
       <p:ext uri="{BB962C8B-B14F-4D97-AF65-F5344CB8AC3E}">
-        <p14:creationId xmlns:p14="http://schemas.microsoft.com/office/powerpoint/2010/main" val="855150801"/>
+        <p14:creationId xmlns:p14="http://schemas.microsoft.com/office/powerpoint/2010/main" val="2306864441"/>
       </p:ext>
     </p:extLst>
   </p:cSld>
   <p:clrMapOvr>
     <a:masterClrMapping/>
   </p:clrMapOvr>
+  <p:timing>
+    <p:tnLst>
+      <p:par>
+        <p:cTn id="1" dur="indefinite" restart="never" nodeType="tmRoot"/>
+      </p:par>
+    </p:tnLst>
+  </p:timing>
 </p:sld>
 </file>
 
-<file path=ppt/slides/slide3.xml><?xml version="1.0" encoding="utf-8"?>
+<file path=ppt/slides/slide13.xml><?xml version="1.0" encoding="utf-8"?>
+<p:sld xmlns:a="http://schemas.openxmlformats.org/drawingml/2006/main" xmlns:r="http://schemas.openxmlformats.org/officeDocument/2006/relationships" xmlns:p="http://schemas.openxmlformats.org/presentationml/2006/main">
+  <p:cSld>
+    <p:spTree>
+      <p:nvGrpSpPr>
+        <p:cNvPr id="1" name=""/>
+        <p:cNvGrpSpPr/>
+        <p:nvPr/>
+      </p:nvGrpSpPr>
+      <p:grpSpPr>
+        <a:xfrm>
+          <a:off x="0" y="0"/>
+          <a:ext cx="0" cy="0"/>
+          <a:chOff x="0" y="0"/>
+          <a:chExt cx="0" cy="0"/>
+        </a:xfrm>
+      </p:grpSpPr>
+      <p:sp>
+        <p:nvSpPr>
+          <p:cNvPr id="2" name="Title 1"/>
+          <p:cNvSpPr>
+            <a:spLocks noGrp="1"/>
+          </p:cNvSpPr>
+          <p:nvPr>
+            <p:ph type="title"/>
+          </p:nvPr>
+        </p:nvSpPr>
+        <p:spPr>
+          <a:xfrm>
+            <a:off x="1141413" y="618518"/>
+            <a:ext cx="9905998" cy="460639"/>
+          </a:xfrm>
+        </p:spPr>
+        <p:txBody>
+          <a:bodyPr>
+            <a:normAutofit fontScale="90000"/>
+          </a:bodyPr>
+          <a:lstStyle/>
+          <a:p>
+            <a:pPr algn="ctr"/>
+            <a:r>
+              <a:rPr lang="en-US" dirty="0" smtClean="0"/>
+              <a:t>9. Safety:</a:t>
+            </a:r>
+            <a:br>
+              <a:rPr lang="en-US" dirty="0" smtClean="0"/>
+            </a:br>
+            <a:r>
+              <a:rPr lang="en-US" dirty="0" smtClean="0"/>
+              <a:t>But Spencer… What about Chernobyl?! I’ve never seen a Wind turbine Blow up!</a:t>
+            </a:r>
+            <a:endParaRPr lang="en-US" dirty="0"/>
+          </a:p>
+        </p:txBody>
+      </p:sp>
+      <p:pic>
+        <p:nvPicPr>
+          <p:cNvPr id="3" name="Picture 2" descr="https://thevelvetrocket.files.wordpress.com/2011/01/chernobyl-1986.jpg"/>
+          <p:cNvPicPr>
+            <a:picLocks noChangeAspect="1" noChangeArrowheads="1"/>
+          </p:cNvPicPr>
+          <p:nvPr/>
+        </p:nvPicPr>
+        <p:blipFill rotWithShape="1">
+          <a:blip r:embed="rId3">
+            <a:extLst>
+              <a:ext uri="{28A0092B-C50C-407E-A947-70E740481C1C}">
+                <a14:useLocalDpi xmlns:a14="http://schemas.microsoft.com/office/drawing/2010/main" val="0"/>
+              </a:ext>
+            </a:extLst>
+          </a:blip>
+          <a:srcRect t="4840" r="315" b="13259"/>
+          <a:stretch/>
+        </p:blipFill>
+        <p:spPr bwMode="auto">
+          <a:xfrm>
+            <a:off x="0" y="1507939"/>
+            <a:ext cx="6096000" cy="3842122"/>
+          </a:xfrm>
+          <a:prstGeom prst="rect">
+            <a:avLst/>
+          </a:prstGeom>
+          <a:noFill/>
+          <a:extLst>
+            <a:ext uri="{909E8E84-426E-40DD-AFC4-6F175D3DCCD1}">
+              <a14:hiddenFill xmlns:a14="http://schemas.microsoft.com/office/drawing/2010/main">
+                <a:solidFill>
+                  <a:srgbClr val="FFFFFF"/>
+                </a:solidFill>
+              </a14:hiddenFill>
+            </a:ext>
+          </a:extLst>
+        </p:spPr>
+      </p:pic>
+      <p:pic>
+        <p:nvPicPr>
+          <p:cNvPr id="5" name="wfzgIxMEo8g"/>
+          <p:cNvPicPr>
+            <a:picLocks noRot="1" noChangeAspect="1"/>
+          </p:cNvPicPr>
+          <p:nvPr>
+            <a:videoFile r:link="rId1"/>
+          </p:nvPr>
+        </p:nvPicPr>
+        <p:blipFill>
+          <a:blip r:embed="rId4"/>
+          <a:stretch>
+            <a:fillRect/>
+          </a:stretch>
+        </p:blipFill>
+        <p:spPr>
+          <a:xfrm>
+            <a:off x="6094412" y="1714052"/>
+            <a:ext cx="6097588" cy="3429893"/>
+          </a:xfrm>
+          <a:prstGeom prst="rect">
+            <a:avLst/>
+          </a:prstGeom>
+        </p:spPr>
+      </p:pic>
+    </p:spTree>
+    <p:extLst>
+      <p:ext uri="{BB962C8B-B14F-4D97-AF65-F5344CB8AC3E}">
+        <p14:creationId xmlns:p14="http://schemas.microsoft.com/office/powerpoint/2010/main" val="2788821153"/>
+      </p:ext>
+    </p:extLst>
+  </p:cSld>
+  <p:clrMapOvr>
+    <a:masterClrMapping/>
+  </p:clrMapOvr>
+  <mc:AlternateContent xmlns:mc="http://schemas.openxmlformats.org/markup-compatibility/2006" xmlns:p14="http://schemas.microsoft.com/office/powerpoint/2010/main">
+    <mc:Choice Requires="p14">
+      <p:transition spd="slow" p14:dur="2000"/>
+    </mc:Choice>
+    <mc:Fallback xmlns="">
+      <p:transition spd="slow"/>
+    </mc:Fallback>
+  </mc:AlternateContent>
+  <p:timing>
+    <p:tnLst>
+      <p:par>
+        <p:cTn id="1" dur="indefinite" restart="never" nodeType="tmRoot">
+          <p:childTnLst>
+            <p:seq concurrent="1" nextAc="seek">
+              <p:cTn id="2" dur="indefinite" nodeType="mainSeq">
+                <p:childTnLst>
+                  <p:par>
+                    <p:cTn id="3" fill="hold">
+                      <p:stCondLst>
+                        <p:cond delay="indefinite"/>
+                        <p:cond evt="onBegin" delay="0">
+                          <p:tn val="2"/>
+                        </p:cond>
+                      </p:stCondLst>
+                      <p:childTnLst>
+                        <p:par>
+                          <p:cTn id="4" fill="hold">
+                            <p:stCondLst>
+                              <p:cond delay="0"/>
+                            </p:stCondLst>
+                            <p:childTnLst>
+                              <p:par>
+                                <p:cTn id="5" presetID="1" presetClass="mediacall" presetSubtype="0" fill="hold" nodeType="afterEffect">
+                                  <p:stCondLst>
+                                    <p:cond delay="0"/>
+                                  </p:stCondLst>
+                                  <p:childTnLst>
+                                    <p:cmd type="call" cmd="playFrom(0.0)">
+                                      <p:cBhvr>
+                                        <p:cTn id="6" dur="1" fill="hold"/>
+                                        <p:tgtEl>
+                                          <p:spTgt spid="5"/>
+                                        </p:tgtEl>
+                                      </p:cBhvr>
+                                    </p:cmd>
+                                  </p:childTnLst>
+                                </p:cTn>
+                              </p:par>
+                            </p:childTnLst>
+                          </p:cTn>
+                        </p:par>
+                      </p:childTnLst>
+                    </p:cTn>
+                  </p:par>
+                </p:childTnLst>
+              </p:cTn>
+              <p:prevCondLst>
+                <p:cond evt="onPrev" delay="0">
+                  <p:tgtEl>
+                    <p:sldTgt/>
+                  </p:tgtEl>
+                </p:cond>
+              </p:prevCondLst>
+              <p:nextCondLst>
+                <p:cond evt="onNext" delay="0">
+                  <p:tgtEl>
+                    <p:sldTgt/>
+                  </p:tgtEl>
+                </p:cond>
+              </p:nextCondLst>
+            </p:seq>
+            <p:video>
+              <p:cMediaNode>
+                <p:cTn id="7" fill="remove" display="0">
+                  <p:stCondLst>
+                    <p:cond delay="indefinite"/>
+                  </p:stCondLst>
+                </p:cTn>
+                <p:tgtEl>
+                  <p:spTgt spid="5"/>
+                </p:tgtEl>
+              </p:cMediaNode>
+            </p:video>
+            <p:seq concurrent="1" nextAc="seek">
+              <p:cTn id="8" restart="whenNotActive" fill="hold" evtFilter="cancelBubble" nodeType="interactiveSeq">
+                <p:stCondLst>
+                  <p:cond evt="onClick" delay="0">
+                    <p:tgtEl>
+                      <p:spTgt spid="5"/>
+                    </p:tgtEl>
+                  </p:cond>
+                </p:stCondLst>
+                <p:endSync evt="end" delay="0">
+                  <p:rtn val="all"/>
+                </p:endSync>
+                <p:childTnLst>
+                  <p:par>
+                    <p:cTn id="9" fill="hold">
+                      <p:stCondLst>
+                        <p:cond delay="0"/>
+                      </p:stCondLst>
+                      <p:childTnLst>
+                        <p:par>
+                          <p:cTn id="10" fill="hold">
+                            <p:stCondLst>
+                              <p:cond delay="0"/>
+                            </p:stCondLst>
+                            <p:childTnLst>
+                              <p:par>
+                                <p:cTn id="11" presetID="2" presetClass="mediacall" presetSubtype="0" fill="hold" nodeType="clickEffect">
+                                  <p:stCondLst>
+                                    <p:cond delay="0"/>
+                                  </p:stCondLst>
+                                  <p:childTnLst>
+                                    <p:cmd type="call" cmd="togglePause">
+                                      <p:cBhvr>
+                                        <p:cTn id="12" dur="1" fill="hold"/>
+                                        <p:tgtEl>
+                                          <p:spTgt spid="5"/>
+                                        </p:tgtEl>
+                                      </p:cBhvr>
+                                    </p:cmd>
+                                  </p:childTnLst>
+                                </p:cTn>
+                              </p:par>
+                            </p:childTnLst>
+                          </p:cTn>
+                        </p:par>
+                      </p:childTnLst>
+                    </p:cTn>
+                  </p:par>
+                </p:childTnLst>
+              </p:cTn>
+              <p:nextCondLst>
+                <p:cond evt="onClick" delay="0">
+                  <p:tgtEl>
+                    <p:spTgt spid="5"/>
+                  </p:tgtEl>
+                </p:cond>
+              </p:nextCondLst>
+            </p:seq>
+          </p:childTnLst>
+        </p:cTn>
+      </p:par>
+    </p:tnLst>
+  </p:timing>
+</p:sld>
+</file>
+
+<file path=ppt/slides/slide14.xml><?xml version="1.0" encoding="utf-8"?>
+<p:sld xmlns:a="http://schemas.openxmlformats.org/drawingml/2006/main" xmlns:r="http://schemas.openxmlformats.org/officeDocument/2006/relationships" xmlns:p="http://schemas.openxmlformats.org/presentationml/2006/main">
+  <p:cSld>
+    <p:spTree>
+      <p:nvGrpSpPr>
+        <p:cNvPr id="1" name=""/>
+        <p:cNvGrpSpPr/>
+        <p:nvPr/>
+      </p:nvGrpSpPr>
+      <p:grpSpPr>
+        <a:xfrm>
+          <a:off x="0" y="0"/>
+          <a:ext cx="0" cy="0"/>
+          <a:chOff x="0" y="0"/>
+          <a:chExt cx="0" cy="0"/>
+        </a:xfrm>
+      </p:grpSpPr>
+      <p:sp>
+        <p:nvSpPr>
+          <p:cNvPr id="2" name="Title 1"/>
+          <p:cNvSpPr>
+            <a:spLocks noGrp="1"/>
+          </p:cNvSpPr>
+          <p:nvPr>
+            <p:ph type="title"/>
+          </p:nvPr>
+        </p:nvSpPr>
+        <p:spPr>
+          <a:xfrm>
+            <a:off x="1141413" y="618518"/>
+            <a:ext cx="9905998" cy="680443"/>
+          </a:xfrm>
+        </p:spPr>
+        <p:txBody>
+          <a:bodyPr>
+            <a:normAutofit/>
+          </a:bodyPr>
+          <a:lstStyle/>
+          <a:p>
+            <a:pPr algn="ctr"/>
+            <a:r>
+              <a:rPr lang="en-US" dirty="0" smtClean="0"/>
+              <a:t>10. Public Support</a:t>
+            </a:r>
+            <a:endParaRPr lang="en-US" dirty="0"/>
+          </a:p>
+        </p:txBody>
+      </p:sp>
+      <p:pic>
+        <p:nvPicPr>
+          <p:cNvPr id="3076" name="Picture 4" descr="Image result for hooray nuclear"/>
+          <p:cNvPicPr>
+            <a:picLocks noChangeAspect="1" noChangeArrowheads="1"/>
+          </p:cNvPicPr>
+          <p:nvPr/>
+        </p:nvPicPr>
+        <p:blipFill>
+          <a:blip r:embed="rId2">
+            <a:extLst>
+              <a:ext uri="{28A0092B-C50C-407E-A947-70E740481C1C}">
+                <a14:useLocalDpi xmlns:a14="http://schemas.microsoft.com/office/drawing/2010/main" val="0"/>
+              </a:ext>
+            </a:extLst>
+          </a:blip>
+          <a:srcRect/>
+          <a:stretch>
+            <a:fillRect/>
+          </a:stretch>
+        </p:blipFill>
+        <p:spPr bwMode="auto">
+          <a:xfrm>
+            <a:off x="2936893" y="1145136"/>
+            <a:ext cx="6315037" cy="4736278"/>
+          </a:xfrm>
+          <a:prstGeom prst="rect">
+            <a:avLst/>
+          </a:prstGeom>
+          <a:noFill/>
+          <a:extLst>
+            <a:ext uri="{909E8E84-426E-40DD-AFC4-6F175D3DCCD1}">
+              <a14:hiddenFill xmlns:a14="http://schemas.microsoft.com/office/drawing/2010/main">
+                <a:solidFill>
+                  <a:srgbClr val="FFFFFF"/>
+                </a:solidFill>
+              </a14:hiddenFill>
+            </a:ext>
+          </a:extLst>
+        </p:spPr>
+      </p:pic>
+    </p:spTree>
+    <p:extLst>
+      <p:ext uri="{BB962C8B-B14F-4D97-AF65-F5344CB8AC3E}">
+        <p14:creationId xmlns:p14="http://schemas.microsoft.com/office/powerpoint/2010/main" val="1976267531"/>
+      </p:ext>
+    </p:extLst>
+  </p:cSld>
+  <p:clrMapOvr>
+    <a:masterClrMapping/>
+  </p:clrMapOvr>
+  <p:timing>
+    <p:tnLst>
+      <p:par>
+        <p:cTn id="1" dur="indefinite" restart="never" nodeType="tmRoot"/>
+      </p:par>
+    </p:tnLst>
+  </p:timing>
+</p:sld>
+</file>
+
+<file path=ppt/slides/slide15.xml><?xml version="1.0" encoding="utf-8"?>
+<p:sld xmlns:a="http://schemas.openxmlformats.org/drawingml/2006/main" xmlns:r="http://schemas.openxmlformats.org/officeDocument/2006/relationships" xmlns:p="http://schemas.openxmlformats.org/presentationml/2006/main">
+  <p:cSld>
+    <p:spTree>
+      <p:nvGrpSpPr>
+        <p:cNvPr id="1" name=""/>
+        <p:cNvGrpSpPr/>
+        <p:nvPr/>
+      </p:nvGrpSpPr>
+      <p:grpSpPr>
+        <a:xfrm>
+          <a:off x="0" y="0"/>
+          <a:ext cx="0" cy="0"/>
+          <a:chOff x="0" y="0"/>
+          <a:chExt cx="0" cy="0"/>
+        </a:xfrm>
+      </p:grpSpPr>
+      <p:pic>
+        <p:nvPicPr>
+          <p:cNvPr id="1026" name="Picture 2" descr="http://www.bechtel.com/getmedia/0b096bc6-6b6d-444a-8971-5128cfca05bb/152182-bechtel-watts-bar-2-power-plant-aerial-2013/?width=975&amp;height=650&amp;ext=.jpg"/>
+          <p:cNvPicPr>
+            <a:picLocks noChangeAspect="1" noChangeArrowheads="1"/>
+          </p:cNvPicPr>
+          <p:nvPr/>
+        </p:nvPicPr>
+        <p:blipFill>
+          <a:blip r:embed="rId2">
+            <a:extLst>
+              <a:ext uri="{28A0092B-C50C-407E-A947-70E740481C1C}">
+                <a14:useLocalDpi xmlns:a14="http://schemas.microsoft.com/office/drawing/2010/main" val="0"/>
+              </a:ext>
+            </a:extLst>
+          </a:blip>
+          <a:srcRect/>
+          <a:stretch>
+            <a:fillRect/>
+          </a:stretch>
+        </p:blipFill>
+        <p:spPr bwMode="auto">
+          <a:xfrm>
+            <a:off x="1452562" y="333375"/>
+            <a:ext cx="9286875" cy="6191250"/>
+          </a:xfrm>
+          <a:prstGeom prst="rect">
+            <a:avLst/>
+          </a:prstGeom>
+          <a:noFill/>
+          <a:extLst>
+            <a:ext uri="{909E8E84-426E-40DD-AFC4-6F175D3DCCD1}">
+              <a14:hiddenFill xmlns:a14="http://schemas.microsoft.com/office/drawing/2010/main">
+                <a:solidFill>
+                  <a:srgbClr val="FFFFFF"/>
+                </a:solidFill>
+              </a14:hiddenFill>
+            </a:ext>
+          </a:extLst>
+        </p:spPr>
+      </p:pic>
+    </p:spTree>
+    <p:extLst>
+      <p:ext uri="{BB962C8B-B14F-4D97-AF65-F5344CB8AC3E}">
+        <p14:creationId xmlns:p14="http://schemas.microsoft.com/office/powerpoint/2010/main" val="614265709"/>
+      </p:ext>
+    </p:extLst>
+  </p:cSld>
+  <p:clrMapOvr>
+    <a:masterClrMapping/>
+  </p:clrMapOvr>
+  <p:timing>
+    <p:tnLst>
+      <p:par>
+        <p:cTn id="1" dur="indefinite" restart="never" nodeType="tmRoot"/>
+      </p:par>
+    </p:tnLst>
+  </p:timing>
+</p:sld>
+</file>
+
+<file path=ppt/slides/slide2.xml><?xml version="1.0" encoding="utf-8"?>
 <p:sld xmlns:a="http://schemas.openxmlformats.org/drawingml/2006/main" xmlns:r="http://schemas.openxmlformats.org/officeDocument/2006/relationships" xmlns:p="http://schemas.openxmlformats.org/presentationml/2006/main">
   <p:cSld>
     <p:spTree>
@@ -12832,10 +13770,17 @@
   <p:clrMapOvr>
     <a:masterClrMapping/>
   </p:clrMapOvr>
+  <p:timing>
+    <p:tnLst>
+      <p:par>
+        <p:cTn id="1" dur="indefinite" restart="never" nodeType="tmRoot"/>
+      </p:par>
+    </p:tnLst>
+  </p:timing>
 </p:sld>
 </file>
 
-<file path=ppt/slides/slide4.xml><?xml version="1.0" encoding="utf-8"?>
+<file path=ppt/slides/slide3.xml><?xml version="1.0" encoding="utf-8"?>
 <p:sld xmlns:a="http://schemas.openxmlformats.org/drawingml/2006/main" xmlns:r="http://schemas.openxmlformats.org/officeDocument/2006/relationships" xmlns:p="http://schemas.openxmlformats.org/presentationml/2006/main">
   <p:cSld>
     <p:spTree>
@@ -12852,10 +13797,70 @@
           <a:chExt cx="0" cy="0"/>
         </a:xfrm>
       </p:grpSpPr>
+      <p:sp>
+        <p:nvSpPr>
+          <p:cNvPr id="2" name="Title 1"/>
+          <p:cNvSpPr>
+            <a:spLocks noGrp="1"/>
+          </p:cNvSpPr>
+          <p:nvPr>
+            <p:ph type="title"/>
+          </p:nvPr>
+        </p:nvSpPr>
+        <p:spPr/>
+        <p:txBody>
+          <a:bodyPr/>
+          <a:lstStyle/>
+          <a:p>
+            <a:endParaRPr lang="en-US"/>
+          </a:p>
+        </p:txBody>
+      </p:sp>
+      <p:pic>
+        <p:nvPicPr>
+          <p:cNvPr id="1026" name="Picture 2" descr="Image result for top 10 david letterman"/>
+          <p:cNvPicPr>
+            <a:picLocks noChangeAspect="1" noChangeArrowheads="1"/>
+          </p:cNvPicPr>
+          <p:nvPr/>
+        </p:nvPicPr>
+        <p:blipFill>
+          <a:blip r:embed="rId2">
+            <a:extLst>
+              <a:ext uri="{28A0092B-C50C-407E-A947-70E740481C1C}">
+                <a14:useLocalDpi xmlns:a14="http://schemas.microsoft.com/office/drawing/2010/main" val="0"/>
+              </a:ext>
+            </a:extLst>
+          </a:blip>
+          <a:srcRect/>
+          <a:stretch>
+            <a:fillRect/>
+          </a:stretch>
+        </p:blipFill>
+        <p:spPr bwMode="auto">
+          <a:xfrm>
+            <a:off x="1744602" y="137745"/>
+            <a:ext cx="8699619" cy="6582510"/>
+          </a:xfrm>
+          <a:prstGeom prst="rect">
+            <a:avLst/>
+          </a:prstGeom>
+          <a:noFill/>
+          <a:extLst>
+            <a:ext uri="{909E8E84-426E-40DD-AFC4-6F175D3DCCD1}">
+              <a14:hiddenFill xmlns:a14="http://schemas.microsoft.com/office/drawing/2010/main">
+                <a:solidFill>
+                  <a:srgbClr val="FFFFFF"/>
+                </a:solidFill>
+              </a14:hiddenFill>
+            </a:ext>
+          </a:extLst>
+        </p:spPr>
+      </p:pic>
     </p:spTree>
     <p:extLst>
       <p:ext uri="{BB962C8B-B14F-4D97-AF65-F5344CB8AC3E}">
-        <p14:creationId xmlns:p14="http://schemas.microsoft.com/office/powerpoint/2010/main" val="1921662961"/>
+        <p14:creationId xmlns:p14="http://schemas.microsoft.com/office/powerpoint/2010/main" val="1773624722"/>
       </p:ext>
     </p:extLst>
   </p:cSld>
@@ -12865,7 +13870,7 @@
 </p:sld>
 </file>
 
-<file path=ppt/slides/slide5.xml><?xml version="1.0" encoding="utf-8"?>
+<file path=ppt/slides/slide4.xml><?xml version="1.0" encoding="utf-8"?>
 <p:sld xmlns:a="http://schemas.openxmlformats.org/drawingml/2006/main" xmlns:r="http://schemas.openxmlformats.org/officeDocument/2006/relationships" xmlns:p="http://schemas.openxmlformats.org/presentationml/2006/main">
   <p:cSld>
     <p:spTree>
@@ -12907,15 +13912,11 @@
             <a:pPr algn="ctr"/>
             <a:r>
               <a:rPr lang="en-US" dirty="0" smtClean="0"/>
-              <a:t>I agree CO</a:t>
-            </a:r>
-            <a:r>
-              <a:rPr lang="en-US" baseline="30000" dirty="0" smtClean="0"/>
-              <a:t>2</a:t>
+              <a:t>1.Zero </a:t>
             </a:r>
             <a:r>
               <a:rPr lang="en-US" dirty="0" smtClean="0"/>
-              <a:t> is bad…</a:t>
+              <a:t>emissions</a:t>
             </a:r>
             <a:endParaRPr lang="en-US" dirty="0"/>
           </a:p>
@@ -12972,6 +13973,167 @@
   <p:clrMapOvr>
     <a:masterClrMapping/>
   </p:clrMapOvr>
+  <p:timing>
+    <p:tnLst>
+      <p:par>
+        <p:cTn id="1" dur="indefinite" restart="never" nodeType="tmRoot"/>
+      </p:par>
+    </p:tnLst>
+  </p:timing>
+</p:sld>
+</file>
+
+<file path=ppt/slides/slide5.xml><?xml version="1.0" encoding="utf-8"?>
+<p:sld xmlns:a="http://schemas.openxmlformats.org/drawingml/2006/main" xmlns:r="http://schemas.openxmlformats.org/officeDocument/2006/relationships" xmlns:p="http://schemas.openxmlformats.org/presentationml/2006/main">
+  <p:cSld>
+    <p:spTree>
+      <p:nvGrpSpPr>
+        <p:cNvPr id="1" name=""/>
+        <p:cNvGrpSpPr/>
+        <p:nvPr/>
+      </p:nvGrpSpPr>
+      <p:grpSpPr>
+        <a:xfrm>
+          <a:off x="0" y="0"/>
+          <a:ext cx="0" cy="0"/>
+          <a:chOff x="0" y="0"/>
+          <a:chExt cx="0" cy="0"/>
+        </a:xfrm>
+      </p:grpSpPr>
+      <p:sp>
+        <p:nvSpPr>
+          <p:cNvPr id="2" name="Title 1"/>
+          <p:cNvSpPr>
+            <a:spLocks noGrp="1"/>
+          </p:cNvSpPr>
+          <p:nvPr>
+            <p:ph type="title"/>
+          </p:nvPr>
+        </p:nvSpPr>
+        <p:spPr>
+          <a:xfrm>
+            <a:off x="1141413" y="618518"/>
+            <a:ext cx="9905998" cy="739286"/>
+          </a:xfrm>
+        </p:spPr>
+        <p:txBody>
+          <a:bodyPr>
+            <a:normAutofit/>
+          </a:bodyPr>
+          <a:lstStyle/>
+          <a:p>
+            <a:pPr algn="ctr"/>
+            <a:r>
+              <a:rPr lang="en-US" dirty="0" smtClean="0"/>
+              <a:t>2. </a:t>
+            </a:r>
+            <a:r>
+              <a:rPr lang="en-US" dirty="0" smtClean="0"/>
+              <a:t>Reliability</a:t>
+            </a:r>
+            <a:endParaRPr lang="en-US" dirty="0"/>
+          </a:p>
+        </p:txBody>
+      </p:sp>
+      <p:pic>
+        <p:nvPicPr>
+          <p:cNvPr id="1026" name="Picture 2" descr="http://www.hypebot.com/.a/6a00d83451b36c69e201b8d1900d05970c-600wi"/>
+          <p:cNvPicPr>
+            <a:picLocks noChangeAspect="1" noChangeArrowheads="1"/>
+          </p:cNvPicPr>
+          <p:nvPr/>
+        </p:nvPicPr>
+        <p:blipFill>
+          <a:blip r:embed="rId2">
+            <a:extLst>
+              <a:ext uri="{28A0092B-C50C-407E-A947-70E740481C1C}">
+                <a14:useLocalDpi xmlns:a14="http://schemas.microsoft.com/office/drawing/2010/main" val="0"/>
+              </a:ext>
+            </a:extLst>
+          </a:blip>
+          <a:srcRect/>
+          <a:stretch>
+            <a:fillRect/>
+          </a:stretch>
+        </p:blipFill>
+        <p:spPr bwMode="auto">
+          <a:xfrm>
+            <a:off x="6091736" y="1673038"/>
+            <a:ext cx="6097088" cy="3511924"/>
+          </a:xfrm>
+          <a:prstGeom prst="rect">
+            <a:avLst/>
+          </a:prstGeom>
+          <a:noFill/>
+          <a:extLst>
+            <a:ext uri="{909E8E84-426E-40DD-AFC4-6F175D3DCCD1}">
+              <a14:hiddenFill xmlns:a14="http://schemas.microsoft.com/office/drawing/2010/main">
+                <a:solidFill>
+                  <a:srgbClr val="FFFFFF"/>
+                </a:solidFill>
+              </a14:hiddenFill>
+            </a:ext>
+          </a:extLst>
+        </p:spPr>
+      </p:pic>
+      <p:pic>
+        <p:nvPicPr>
+          <p:cNvPr id="1030" name="Picture 6" descr="http://i.dailymail.co.uk/i/pix/2014/08/15/article-2725415-208925A500000578-155_964x644.jpg"/>
+          <p:cNvPicPr>
+            <a:picLocks noChangeAspect="1" noChangeArrowheads="1"/>
+          </p:cNvPicPr>
+          <p:nvPr/>
+        </p:nvPicPr>
+        <p:blipFill>
+          <a:blip r:embed="rId3">
+            <a:extLst>
+              <a:ext uri="{28A0092B-C50C-407E-A947-70E740481C1C}">
+                <a14:useLocalDpi xmlns:a14="http://schemas.microsoft.com/office/drawing/2010/main" val="0"/>
+              </a:ext>
+            </a:extLst>
+          </a:blip>
+          <a:srcRect/>
+          <a:stretch>
+            <a:fillRect/>
+          </a:stretch>
+        </p:blipFill>
+        <p:spPr bwMode="auto">
+          <a:xfrm>
+            <a:off x="0" y="1357803"/>
+            <a:ext cx="6098677" cy="4074220"/>
+          </a:xfrm>
+          <a:prstGeom prst="rect">
+            <a:avLst/>
+          </a:prstGeom>
+          <a:noFill/>
+          <a:extLst>
+            <a:ext uri="{909E8E84-426E-40DD-AFC4-6F175D3DCCD1}">
+              <a14:hiddenFill xmlns:a14="http://schemas.microsoft.com/office/drawing/2010/main">
+                <a:solidFill>
+                  <a:srgbClr val="FFFFFF"/>
+                </a:solidFill>
+              </a14:hiddenFill>
+            </a:ext>
+          </a:extLst>
+        </p:spPr>
+      </p:pic>
+    </p:spTree>
+    <p:extLst>
+      <p:ext uri="{BB962C8B-B14F-4D97-AF65-F5344CB8AC3E}">
+        <p14:creationId xmlns:p14="http://schemas.microsoft.com/office/powerpoint/2010/main" val="3622083520"/>
+      </p:ext>
+    </p:extLst>
+  </p:cSld>
+  <p:clrMapOvr>
+    <a:masterClrMapping/>
+  </p:clrMapOvr>
+  <p:timing>
+    <p:tnLst>
+      <p:par>
+        <p:cTn id="1" dur="indefinite" restart="never" nodeType="tmRoot"/>
+      </p:par>
+    </p:tnLst>
+  </p:timing>
 </p:sld>
 </file>
 
@@ -13005,7 +14167,7 @@
         <p:spPr>
           <a:xfrm>
             <a:off x="1141413" y="618518"/>
-            <a:ext cx="9905998" cy="460639"/>
+            <a:ext cx="9905998" cy="439317"/>
           </a:xfrm>
         </p:spPr>
         <p:txBody>
@@ -13017,7 +14179,11 @@
             <a:pPr algn="ctr"/>
             <a:r>
               <a:rPr lang="en-US" dirty="0" smtClean="0"/>
-              <a:t>But Spencer… What about Chernobyl?!</a:t>
+              <a:t>3. </a:t>
+            </a:r>
+            <a:r>
+              <a:rPr lang="en-US" dirty="0" smtClean="0"/>
+              <a:t>Low Cost</a:t>
             </a:r>
             <a:endParaRPr lang="en-US" dirty="0"/>
           </a:p>
@@ -13025,13 +14191,13 @@
       </p:sp>
       <p:pic>
         <p:nvPicPr>
-          <p:cNvPr id="3" name="Picture 2" descr="https://thevelvetrocket.files.wordpress.com/2011/01/chernobyl-1986.jpg"/>
+          <p:cNvPr id="2052" name="Picture 4" descr="Image result for wind power subsidies"/>
           <p:cNvPicPr>
             <a:picLocks noChangeAspect="1" noChangeArrowheads="1"/>
           </p:cNvPicPr>
           <p:nvPr/>
         </p:nvPicPr>
-        <p:blipFill rotWithShape="1">
+        <p:blipFill>
           <a:blip r:embed="rId2">
             <a:extLst>
               <a:ext uri="{28A0092B-C50C-407E-A947-70E740481C1C}">
@@ -13039,13 +14205,15 @@
               </a:ext>
             </a:extLst>
           </a:blip>
-          <a:srcRect t="4840" r="315" b="13259"/>
-          <a:stretch/>
+          <a:srcRect/>
+          <a:stretch>
+            <a:fillRect/>
+          </a:stretch>
         </p:blipFill>
         <p:spPr bwMode="auto">
           <a:xfrm>
-            <a:off x="2571679" y="1207729"/>
-            <a:ext cx="7048641" cy="4442542"/>
+            <a:off x="3238500" y="1390649"/>
+            <a:ext cx="5715000" cy="4076701"/>
           </a:xfrm>
           <a:prstGeom prst="rect">
             <a:avLst/>
@@ -13065,13 +14233,20 @@
     </p:spTree>
     <p:extLst>
       <p:ext uri="{BB962C8B-B14F-4D97-AF65-F5344CB8AC3E}">
-        <p14:creationId xmlns:p14="http://schemas.microsoft.com/office/powerpoint/2010/main" val="2788821153"/>
+        <p14:creationId xmlns:p14="http://schemas.microsoft.com/office/powerpoint/2010/main" val="3847995326"/>
       </p:ext>
     </p:extLst>
   </p:cSld>
   <p:clrMapOvr>
     <a:masterClrMapping/>
   </p:clrMapOvr>
+  <p:timing>
+    <p:tnLst>
+      <p:par>
+        <p:cTn id="1" dur="indefinite" restart="never" nodeType="tmRoot"/>
+      </p:par>
+    </p:tnLst>
+  </p:timing>
 </p:sld>
 </file>
 
@@ -13104,8 +14279,8 @@
         </p:nvSpPr>
         <p:spPr>
           <a:xfrm>
-            <a:off x="1141413" y="618519"/>
-            <a:ext cx="9905998" cy="907175"/>
+            <a:off x="1141413" y="618518"/>
+            <a:ext cx="9905998" cy="376564"/>
           </a:xfrm>
         </p:spPr>
         <p:txBody>
@@ -13116,12 +14291,8 @@
           <a:p>
             <a:pPr algn="ctr"/>
             <a:r>
-              <a:rPr lang="en-US" dirty="0" err="1" smtClean="0"/>
-              <a:t>Ooohhh</a:t>
-            </a:r>
-            <a:r>
               <a:rPr lang="en-US" dirty="0" smtClean="0"/>
-              <a:t>… I’ve heard that’s bad, but I’m not sure how it works.</a:t>
+              <a:t>4. Land Conservation</a:t>
             </a:r>
             <a:endParaRPr lang="en-US" dirty="0"/>
           </a:p>
@@ -13129,7 +14300,7 @@
       </p:sp>
       <p:pic>
         <p:nvPicPr>
-          <p:cNvPr id="3" name="Picture 2" descr="http://zidbits.com/wp-content/uploads/2011/04/Power-Plant-work2.jpg"/>
+          <p:cNvPr id="3074" name="Picture 2" descr="http://www.aerialarchives.com/stock/img/AHLB7459.jpg"/>
           <p:cNvPicPr>
             <a:picLocks noChangeAspect="1" noChangeArrowheads="1"/>
           </p:cNvPicPr>
@@ -13150,8 +14321,8 @@
         </p:blipFill>
         <p:spPr bwMode="auto">
           <a:xfrm>
-            <a:off x="2195785" y="1525694"/>
-            <a:ext cx="7800429" cy="3806611"/>
+            <a:off x="2708928" y="1173209"/>
+            <a:ext cx="6774143" cy="4511581"/>
           </a:xfrm>
           <a:prstGeom prst="rect">
             <a:avLst/>
@@ -13171,13 +14342,20 @@
     </p:spTree>
     <p:extLst>
       <p:ext uri="{BB962C8B-B14F-4D97-AF65-F5344CB8AC3E}">
-        <p14:creationId xmlns:p14="http://schemas.microsoft.com/office/powerpoint/2010/main" val="1532819735"/>
+        <p14:creationId xmlns:p14="http://schemas.microsoft.com/office/powerpoint/2010/main" val="1056600600"/>
       </p:ext>
     </p:extLst>
   </p:cSld>
   <p:clrMapOvr>
     <a:masterClrMapping/>
   </p:clrMapOvr>
+  <p:timing>
+    <p:tnLst>
+      <p:par>
+        <p:cTn id="1" dur="indefinite" restart="never" nodeType="tmRoot"/>
+      </p:par>
+    </p:tnLst>
+  </p:timing>
 </p:sld>
 </file>
 
@@ -13208,48 +14386,89 @@
             <p:ph type="title"/>
           </p:nvPr>
         </p:nvSpPr>
-        <p:spPr/>
+        <p:spPr>
+          <a:xfrm>
+            <a:off x="1141413" y="618518"/>
+            <a:ext cx="9905998" cy="555858"/>
+          </a:xfrm>
+        </p:spPr>
         <p:txBody>
-          <a:bodyPr/>
+          <a:bodyPr>
+            <a:normAutofit fontScale="90000"/>
+          </a:bodyPr>
           <a:lstStyle/>
           <a:p>
+            <a:pPr algn="ctr"/>
             <a:r>
               <a:rPr lang="en-US" dirty="0" smtClean="0"/>
-              <a:t>Incorporate Story bring Up Chernobyl and Jap one Frequently</a:t>
+              <a:t>5. Fewer </a:t>
+            </a:r>
+            <a:r>
+              <a:rPr lang="en-US" dirty="0" smtClean="0"/>
+              <a:t>new transmission lines</a:t>
             </a:r>
             <a:endParaRPr lang="en-US" dirty="0"/>
           </a:p>
         </p:txBody>
       </p:sp>
-      <p:sp>
-        <p:nvSpPr>
-          <p:cNvPr id="3" name="Content Placeholder 2"/>
-          <p:cNvSpPr>
-            <a:spLocks noGrp="1"/>
-          </p:cNvSpPr>
-          <p:nvPr>
-            <p:ph idx="1"/>
-          </p:nvPr>
-        </p:nvSpPr>
-        <p:spPr/>
-        <p:txBody>
-          <a:bodyPr/>
-          <a:lstStyle/>
-          <a:p>
-            <a:endParaRPr lang="en-US"/>
-          </a:p>
-        </p:txBody>
-      </p:sp>
+      <p:pic>
+        <p:nvPicPr>
+          <p:cNvPr id="4098" name="Picture 2" descr="https://windaction.files.wordpress.com/2012/11/transmission-line.jpg"/>
+          <p:cNvPicPr>
+            <a:picLocks noChangeAspect="1" noChangeArrowheads="1"/>
+          </p:cNvPicPr>
+          <p:nvPr/>
+        </p:nvPicPr>
+        <p:blipFill>
+          <a:blip r:embed="rId2">
+            <a:extLst>
+              <a:ext uri="{28A0092B-C50C-407E-A947-70E740481C1C}">
+                <a14:useLocalDpi xmlns:a14="http://schemas.microsoft.com/office/drawing/2010/main" val="0"/>
+              </a:ext>
+            </a:extLst>
+          </a:blip>
+          <a:srcRect/>
+          <a:stretch>
+            <a:fillRect/>
+          </a:stretch>
+        </p:blipFill>
+        <p:spPr bwMode="auto">
+          <a:xfrm>
+            <a:off x="3675062" y="1174376"/>
+            <a:ext cx="4838700" cy="4953001"/>
+          </a:xfrm>
+          <a:prstGeom prst="rect">
+            <a:avLst/>
+          </a:prstGeom>
+          <a:noFill/>
+          <a:extLst>
+            <a:ext uri="{909E8E84-426E-40DD-AFC4-6F175D3DCCD1}">
+              <a14:hiddenFill xmlns:a14="http://schemas.microsoft.com/office/drawing/2010/main">
+                <a:solidFill>
+                  <a:srgbClr val="FFFFFF"/>
+                </a:solidFill>
+              </a14:hiddenFill>
+            </a:ext>
+          </a:extLst>
+        </p:spPr>
+      </p:pic>
     </p:spTree>
     <p:extLst>
       <p:ext uri="{BB962C8B-B14F-4D97-AF65-F5344CB8AC3E}">
-        <p14:creationId xmlns:p14="http://schemas.microsoft.com/office/powerpoint/2010/main" val="3263526434"/>
+        <p14:creationId xmlns:p14="http://schemas.microsoft.com/office/powerpoint/2010/main" val="1403779520"/>
       </p:ext>
     </p:extLst>
   </p:cSld>
   <p:clrMapOvr>
     <a:masterClrMapping/>
   </p:clrMapOvr>
+  <p:timing>
+    <p:tnLst>
+      <p:par>
+        <p:cTn id="1" dur="indefinite" restart="never" nodeType="tmRoot"/>
+      </p:par>
+    </p:tnLst>
+  </p:timing>
 </p:sld>
 </file>
 
@@ -13280,48 +14499,85 @@
             <p:ph type="title"/>
           </p:nvPr>
         </p:nvSpPr>
-        <p:spPr/>
+        <p:spPr>
+          <a:xfrm>
+            <a:off x="1141413" y="618518"/>
+            <a:ext cx="9905998" cy="528964"/>
+          </a:xfrm>
+        </p:spPr>
         <p:txBody>
-          <a:bodyPr/>
+          <a:bodyPr>
+            <a:normAutofit fontScale="90000"/>
+          </a:bodyPr>
           <a:lstStyle/>
           <a:p>
+            <a:pPr algn="ctr"/>
             <a:r>
               <a:rPr lang="en-US" dirty="0" smtClean="0"/>
-              <a:t>Compel Change</a:t>
+              <a:t>6. jobs</a:t>
             </a:r>
             <a:endParaRPr lang="en-US" dirty="0"/>
           </a:p>
         </p:txBody>
       </p:sp>
-      <p:sp>
-        <p:nvSpPr>
-          <p:cNvPr id="3" name="Content Placeholder 2"/>
-          <p:cNvSpPr>
-            <a:spLocks noGrp="1"/>
-          </p:cNvSpPr>
-          <p:nvPr>
-            <p:ph idx="1"/>
-          </p:nvPr>
-        </p:nvSpPr>
-        <p:spPr/>
-        <p:txBody>
-          <a:bodyPr/>
-          <a:lstStyle/>
-          <a:p>
-            <a:endParaRPr lang="en-US"/>
-          </a:p>
-        </p:txBody>
-      </p:sp>
+      <p:pic>
+        <p:nvPicPr>
+          <p:cNvPr id="5122" name="Picture 2" descr="Image result for nuclear energy jobs"/>
+          <p:cNvPicPr>
+            <a:picLocks noChangeAspect="1" noChangeArrowheads="1"/>
+          </p:cNvPicPr>
+          <p:nvPr/>
+        </p:nvPicPr>
+        <p:blipFill>
+          <a:blip r:embed="rId2">
+            <a:extLst>
+              <a:ext uri="{28A0092B-C50C-407E-A947-70E740481C1C}">
+                <a14:useLocalDpi xmlns:a14="http://schemas.microsoft.com/office/drawing/2010/main" val="0"/>
+              </a:ext>
+            </a:extLst>
+          </a:blip>
+          <a:srcRect/>
+          <a:stretch>
+            <a:fillRect/>
+          </a:stretch>
+        </p:blipFill>
+        <p:spPr bwMode="auto">
+          <a:xfrm>
+            <a:off x="3144463" y="1069041"/>
+            <a:ext cx="5899898" cy="4719918"/>
+          </a:xfrm>
+          <a:prstGeom prst="rect">
+            <a:avLst/>
+          </a:prstGeom>
+          <a:noFill/>
+          <a:extLst>
+            <a:ext uri="{909E8E84-426E-40DD-AFC4-6F175D3DCCD1}">
+              <a14:hiddenFill xmlns:a14="http://schemas.microsoft.com/office/drawing/2010/main">
+                <a:solidFill>
+                  <a:srgbClr val="FFFFFF"/>
+                </a:solidFill>
+              </a14:hiddenFill>
+            </a:ext>
+          </a:extLst>
+        </p:spPr>
+      </p:pic>
     </p:spTree>
     <p:extLst>
       <p:ext uri="{BB962C8B-B14F-4D97-AF65-F5344CB8AC3E}">
-        <p14:creationId xmlns:p14="http://schemas.microsoft.com/office/powerpoint/2010/main" val="3020160255"/>
+        <p14:creationId xmlns:p14="http://schemas.microsoft.com/office/powerpoint/2010/main" val="2218403669"/>
       </p:ext>
     </p:extLst>
   </p:cSld>
   <p:clrMapOvr>
     <a:masterClrMapping/>
   </p:clrMapOvr>
+  <p:timing>
+    <p:tnLst>
+      <p:par>
+        <p:cTn id="1" dur="indefinite" restart="never" nodeType="tmRoot"/>
+      </p:par>
+    </p:tnLst>
+  </p:timing>
 </p:sld>
 </file>
 
@@ -13574,4 +14830,265 @@
     </a:ext>
   </a:extLst>
 </a:theme>
+</file>
+
+<file path=ppt/theme/theme2.xml><?xml version="1.0" encoding="utf-8"?>
+<a:theme xmlns:a="http://schemas.openxmlformats.org/drawingml/2006/main" name="Office Theme">
+  <a:themeElements>
+    <a:clrScheme name="Office">
+      <a:dk1>
+        <a:sysClr val="windowText" lastClr="000000"/>
+      </a:dk1>
+      <a:lt1>
+        <a:sysClr val="window" lastClr="FFFFFF"/>
+      </a:lt1>
+      <a:dk2>
+        <a:srgbClr val="44546A"/>
+      </a:dk2>
+      <a:lt2>
+        <a:srgbClr val="E7E6E6"/>
+      </a:lt2>
+      <a:accent1>
+        <a:srgbClr val="5B9BD5"/>
+      </a:accent1>
+      <a:accent2>
+        <a:srgbClr val="ED7D31"/>
+      </a:accent2>
+      <a:accent3>
+        <a:srgbClr val="A5A5A5"/>
+      </a:accent3>
+      <a:accent4>
+        <a:srgbClr val="FFC000"/>
+      </a:accent4>
+      <a:accent5>
+        <a:srgbClr val="4472C4"/>
+      </a:accent5>
+      <a:accent6>
+        <a:srgbClr val="70AD47"/>
+      </a:accent6>
+      <a:hlink>
+        <a:srgbClr val="0563C1"/>
+      </a:hlink>
+      <a:folHlink>
+        <a:srgbClr val="954F72"/>
+      </a:folHlink>
+    </a:clrScheme>
+    <a:fontScheme name="Office">
+      <a:majorFont>
+        <a:latin typeface="Calibri Light" panose="020F0302020204030204"/>
+        <a:ea typeface=""/>
+        <a:cs typeface=""/>
+        <a:font script="Jpan" typeface="ＭＳ Ｐゴシック"/>
+        <a:font script="Hang" typeface="맑은 고딕"/>
+        <a:font script="Hans" typeface="宋体"/>
+        <a:font script="Hant" typeface="新細明體"/>
+        <a:font script="Arab" typeface="Times New Roman"/>
+        <a:font script="Hebr" typeface="Times New Roman"/>
+        <a:font script="Thai" typeface="Angsana New"/>
+        <a:font script="Ethi" typeface="Nyala"/>
+        <a:font script="Beng" typeface="Vrinda"/>
+        <a:font script="Gujr" typeface="Shruti"/>
+        <a:font script="Khmr" typeface="MoolBoran"/>
+        <a:font script="Knda" typeface="Tunga"/>
+        <a:font script="Guru" typeface="Raavi"/>
+        <a:font script="Cans" typeface="Euphemia"/>
+        <a:font script="Cher" typeface="Plantagenet Cherokee"/>
+        <a:font script="Yiii" typeface="Microsoft Yi Baiti"/>
+        <a:font script="Tibt" typeface="Microsoft Himalaya"/>
+        <a:font script="Thaa" typeface="MV Boli"/>
+        <a:font script="Deva" typeface="Mangal"/>
+        <a:font script="Telu" typeface="Gautami"/>
+        <a:font script="Taml" typeface="Latha"/>
+        <a:font script="Syrc" typeface="Estrangelo Edessa"/>
+        <a:font script="Orya" typeface="Kalinga"/>
+        <a:font script="Mlym" typeface="Kartika"/>
+        <a:font script="Laoo" typeface="DokChampa"/>
+        <a:font script="Sinh" typeface="Iskoola Pota"/>
+        <a:font script="Mong" typeface="Mongolian Baiti"/>
+        <a:font script="Viet" typeface="Times New Roman"/>
+        <a:font script="Uigh" typeface="Microsoft Uighur"/>
+        <a:font script="Geor" typeface="Sylfaen"/>
+      </a:majorFont>
+      <a:minorFont>
+        <a:latin typeface="Calibri" panose="020F0502020204030204"/>
+        <a:ea typeface=""/>
+        <a:cs typeface=""/>
+        <a:font script="Jpan" typeface="ＭＳ Ｐゴシック"/>
+        <a:font script="Hang" typeface="맑은 고딕"/>
+        <a:font script="Hans" typeface="宋体"/>
+        <a:font script="Hant" typeface="新細明體"/>
+        <a:font script="Arab" typeface="Arial"/>
+        <a:font script="Hebr" typeface="Arial"/>
+        <a:font script="Thai" typeface="Cordia New"/>
+        <a:font script="Ethi" typeface="Nyala"/>
+        <a:font script="Beng" typeface="Vrinda"/>
+        <a:font script="Gujr" typeface="Shruti"/>
+        <a:font script="Khmr" typeface="DaunPenh"/>
+        <a:font script="Knda" typeface="Tunga"/>
+        <a:font script="Guru" typeface="Raavi"/>
+        <a:font script="Cans" typeface="Euphemia"/>
+        <a:font script="Cher" typeface="Plantagenet Cherokee"/>
+        <a:font script="Yiii" typeface="Microsoft Yi Baiti"/>
+        <a:font script="Tibt" typeface="Microsoft Himalaya"/>
+        <a:font script="Thaa" typeface="MV Boli"/>
+        <a:font script="Deva" typeface="Mangal"/>
+        <a:font script="Telu" typeface="Gautami"/>
+        <a:font script="Taml" typeface="Latha"/>
+        <a:font script="Syrc" typeface="Estrangelo Edessa"/>
+        <a:font script="Orya" typeface="Kalinga"/>
+        <a:font script="Mlym" typeface="Kartika"/>
+        <a:font script="Laoo" typeface="DokChampa"/>
+        <a:font script="Sinh" typeface="Iskoola Pota"/>
+        <a:font script="Mong" typeface="Mongolian Baiti"/>
+        <a:font script="Viet" typeface="Arial"/>
+        <a:font script="Uigh" typeface="Microsoft Uighur"/>
+        <a:font script="Geor" typeface="Sylfaen"/>
+      </a:minorFont>
+    </a:fontScheme>
+    <a:fmtScheme name="Office">
+      <a:fillStyleLst>
+        <a:solidFill>
+          <a:schemeClr val="phClr"/>
+        </a:solidFill>
+        <a:gradFill rotWithShape="1">
+          <a:gsLst>
+            <a:gs pos="0">
+              <a:schemeClr val="phClr">
+                <a:lumMod val="110000"/>
+                <a:satMod val="105000"/>
+                <a:tint val="67000"/>
+              </a:schemeClr>
+            </a:gs>
+            <a:gs pos="50000">
+              <a:schemeClr val="phClr">
+                <a:lumMod val="105000"/>
+                <a:satMod val="103000"/>
+                <a:tint val="73000"/>
+              </a:schemeClr>
+            </a:gs>
+            <a:gs pos="100000">
+              <a:schemeClr val="phClr">
+                <a:lumMod val="105000"/>
+                <a:satMod val="109000"/>
+                <a:tint val="81000"/>
+              </a:schemeClr>
+            </a:gs>
+          </a:gsLst>
+          <a:lin ang="5400000" scaled="0"/>
+        </a:gradFill>
+        <a:gradFill rotWithShape="1">
+          <a:gsLst>
+            <a:gs pos="0">
+              <a:schemeClr val="phClr">
+                <a:satMod val="103000"/>
+                <a:lumMod val="102000"/>
+                <a:tint val="94000"/>
+              </a:schemeClr>
+            </a:gs>
+            <a:gs pos="50000">
+              <a:schemeClr val="phClr">
+                <a:satMod val="110000"/>
+                <a:lumMod val="100000"/>
+                <a:shade val="100000"/>
+              </a:schemeClr>
+            </a:gs>
+            <a:gs pos="100000">
+              <a:schemeClr val="phClr">
+                <a:lumMod val="99000"/>
+                <a:satMod val="120000"/>
+                <a:shade val="78000"/>
+              </a:schemeClr>
+            </a:gs>
+          </a:gsLst>
+          <a:lin ang="5400000" scaled="0"/>
+        </a:gradFill>
+      </a:fillStyleLst>
+      <a:lnStyleLst>
+        <a:ln w="6350" cap="flat" cmpd="sng" algn="ctr">
+          <a:solidFill>
+            <a:schemeClr val="phClr"/>
+          </a:solidFill>
+          <a:prstDash val="solid"/>
+          <a:miter lim="800000"/>
+        </a:ln>
+        <a:ln w="12700" cap="flat" cmpd="sng" algn="ctr">
+          <a:solidFill>
+            <a:schemeClr val="phClr"/>
+          </a:solidFill>
+          <a:prstDash val="solid"/>
+          <a:miter lim="800000"/>
+        </a:ln>
+        <a:ln w="19050" cap="flat" cmpd="sng" algn="ctr">
+          <a:solidFill>
+            <a:schemeClr val="phClr"/>
+          </a:solidFill>
+          <a:prstDash val="solid"/>
+          <a:miter lim="800000"/>
+        </a:ln>
+      </a:lnStyleLst>
+      <a:effectStyleLst>
+        <a:effectStyle>
+          <a:effectLst/>
+        </a:effectStyle>
+        <a:effectStyle>
+          <a:effectLst/>
+        </a:effectStyle>
+        <a:effectStyle>
+          <a:effectLst>
+            <a:outerShdw blurRad="57150" dist="19050" dir="5400000" algn="ctr" rotWithShape="0">
+              <a:srgbClr val="000000">
+                <a:alpha val="63000"/>
+              </a:srgbClr>
+            </a:outerShdw>
+          </a:effectLst>
+        </a:effectStyle>
+      </a:effectStyleLst>
+      <a:bgFillStyleLst>
+        <a:solidFill>
+          <a:schemeClr val="phClr"/>
+        </a:solidFill>
+        <a:solidFill>
+          <a:schemeClr val="phClr">
+            <a:tint val="95000"/>
+            <a:satMod val="170000"/>
+          </a:schemeClr>
+        </a:solidFill>
+        <a:gradFill rotWithShape="1">
+          <a:gsLst>
+            <a:gs pos="0">
+              <a:schemeClr val="phClr">
+                <a:tint val="93000"/>
+                <a:satMod val="150000"/>
+                <a:shade val="98000"/>
+                <a:lumMod val="102000"/>
+              </a:schemeClr>
+            </a:gs>
+            <a:gs pos="50000">
+              <a:schemeClr val="phClr">
+                <a:tint val="98000"/>
+                <a:satMod val="130000"/>
+                <a:shade val="90000"/>
+                <a:lumMod val="103000"/>
+              </a:schemeClr>
+            </a:gs>
+            <a:gs pos="100000">
+              <a:schemeClr val="phClr">
+                <a:shade val="63000"/>
+                <a:satMod val="120000"/>
+              </a:schemeClr>
+            </a:gs>
+          </a:gsLst>
+          <a:lin ang="5400000" scaled="0"/>
+        </a:gradFill>
+      </a:bgFillStyleLst>
+    </a:fmtScheme>
+  </a:themeElements>
+  <a:objectDefaults/>
+  <a:extraClrSchemeLst/>
+  <a:extLst>
+    <a:ext uri="{05A4C25C-085E-4340-85A3-A5531E510DB2}">
+      <thm15:themeFamily xmlns:thm15="http://schemas.microsoft.com/office/thememl/2012/main" name="Office Theme" id="{62F939B6-93AF-4DB8-9C6B-D6C7DFDC589F}" vid="{4A3C46E8-61CC-4603-A589-7422A47A8E4A}"/>
+    </a:ext>
+  </a:extLst>
+</a:theme>
 </file>
</xml_diff>